<commit_message>
Image updates in readme
</commit_message>
<xml_diff>
--- a/images/Tic tac toe.pptx
+++ b/images/Tic tac toe.pptx
@@ -13,7 +13,8 @@
     <p:sldId id="314" r:id="rId10"/>
     <p:sldId id="315" r:id="rId11"/>
     <p:sldId id="316" r:id="rId12"/>
-    <p:sldId id="317" r:id="rId13"/>
+    <p:sldId id="319" r:id="rId13"/>
+    <p:sldId id="317" r:id="rId14"/>
   </p:sldIdLst>
   <p:sldSz cx="12192000" cy="6858000"/>
   <p:notesSz cx="6858000" cy="9144000"/>
@@ -118,6 +119,2651 @@
     </p:ext>
   </p:extLst>
 </p:presentation>
+</file>
+
+<file path=ppt/diagrams/colors1.xml><?xml version="1.0" encoding="utf-8"?>
+<dgm:colorsDef xmlns:dgm="http://schemas.openxmlformats.org/drawingml/2006/diagram" xmlns:a="http://schemas.openxmlformats.org/drawingml/2006/main" uniqueId="urn:microsoft.com/office/officeart/2005/8/colors/accent1_2">
+  <dgm:title val=""/>
+  <dgm:desc val=""/>
+  <dgm:catLst>
+    <dgm:cat type="accent1" pri="11200"/>
+  </dgm:catLst>
+  <dgm:styleLbl name="node0">
+    <dgm:fillClrLst meth="repeat">
+      <a:schemeClr val="accent1"/>
+    </dgm:fillClrLst>
+    <dgm:linClrLst meth="repeat">
+      <a:schemeClr val="lt1"/>
+    </dgm:linClrLst>
+    <dgm:effectClrLst/>
+    <dgm:txLinClrLst/>
+    <dgm:txFillClrLst/>
+    <dgm:txEffectClrLst/>
+  </dgm:styleLbl>
+  <dgm:styleLbl name="alignNode1">
+    <dgm:fillClrLst meth="repeat">
+      <a:schemeClr val="accent1"/>
+    </dgm:fillClrLst>
+    <dgm:linClrLst meth="repeat">
+      <a:schemeClr val="accent1"/>
+    </dgm:linClrLst>
+    <dgm:effectClrLst/>
+    <dgm:txLinClrLst/>
+    <dgm:txFillClrLst/>
+    <dgm:txEffectClrLst/>
+  </dgm:styleLbl>
+  <dgm:styleLbl name="node1">
+    <dgm:fillClrLst meth="repeat">
+      <a:schemeClr val="accent1"/>
+    </dgm:fillClrLst>
+    <dgm:linClrLst meth="repeat">
+      <a:schemeClr val="lt1"/>
+    </dgm:linClrLst>
+    <dgm:effectClrLst/>
+    <dgm:txLinClrLst/>
+    <dgm:txFillClrLst/>
+    <dgm:txEffectClrLst/>
+  </dgm:styleLbl>
+  <dgm:styleLbl name="lnNode1">
+    <dgm:fillClrLst meth="repeat">
+      <a:schemeClr val="accent1"/>
+    </dgm:fillClrLst>
+    <dgm:linClrLst meth="repeat">
+      <a:schemeClr val="lt1"/>
+    </dgm:linClrLst>
+    <dgm:effectClrLst/>
+    <dgm:txLinClrLst/>
+    <dgm:txFillClrLst/>
+    <dgm:txEffectClrLst/>
+  </dgm:styleLbl>
+  <dgm:styleLbl name="vennNode1">
+    <dgm:fillClrLst meth="repeat">
+      <a:schemeClr val="accent1">
+        <a:alpha val="50000"/>
+      </a:schemeClr>
+    </dgm:fillClrLst>
+    <dgm:linClrLst meth="repeat">
+      <a:schemeClr val="lt1"/>
+    </dgm:linClrLst>
+    <dgm:effectClrLst/>
+    <dgm:txLinClrLst/>
+    <dgm:txFillClrLst/>
+    <dgm:txEffectClrLst/>
+  </dgm:styleLbl>
+  <dgm:styleLbl name="node2">
+    <dgm:fillClrLst meth="repeat">
+      <a:schemeClr val="accent1"/>
+    </dgm:fillClrLst>
+    <dgm:linClrLst meth="repeat">
+      <a:schemeClr val="lt1"/>
+    </dgm:linClrLst>
+    <dgm:effectClrLst/>
+    <dgm:txLinClrLst/>
+    <dgm:txFillClrLst/>
+    <dgm:txEffectClrLst/>
+  </dgm:styleLbl>
+  <dgm:styleLbl name="node3">
+    <dgm:fillClrLst meth="repeat">
+      <a:schemeClr val="accent1"/>
+    </dgm:fillClrLst>
+    <dgm:linClrLst meth="repeat">
+      <a:schemeClr val="lt1"/>
+    </dgm:linClrLst>
+    <dgm:effectClrLst/>
+    <dgm:txLinClrLst/>
+    <dgm:txFillClrLst/>
+    <dgm:txEffectClrLst/>
+  </dgm:styleLbl>
+  <dgm:styleLbl name="node4">
+    <dgm:fillClrLst meth="repeat">
+      <a:schemeClr val="accent1"/>
+    </dgm:fillClrLst>
+    <dgm:linClrLst meth="repeat">
+      <a:schemeClr val="lt1"/>
+    </dgm:linClrLst>
+    <dgm:effectClrLst/>
+    <dgm:txLinClrLst/>
+    <dgm:txFillClrLst/>
+    <dgm:txEffectClrLst/>
+  </dgm:styleLbl>
+  <dgm:styleLbl name="fgImgPlace1">
+    <dgm:fillClrLst meth="repeat">
+      <a:schemeClr val="accent1">
+        <a:tint val="50000"/>
+      </a:schemeClr>
+    </dgm:fillClrLst>
+    <dgm:linClrLst meth="repeat">
+      <a:schemeClr val="lt1"/>
+    </dgm:linClrLst>
+    <dgm:effectClrLst/>
+    <dgm:txLinClrLst/>
+    <dgm:txFillClrLst meth="repeat">
+      <a:schemeClr val="lt1"/>
+    </dgm:txFillClrLst>
+    <dgm:txEffectClrLst/>
+  </dgm:styleLbl>
+  <dgm:styleLbl name="alignImgPlace1">
+    <dgm:fillClrLst meth="repeat">
+      <a:schemeClr val="accent1">
+        <a:tint val="50000"/>
+      </a:schemeClr>
+    </dgm:fillClrLst>
+    <dgm:linClrLst meth="repeat">
+      <a:schemeClr val="lt1"/>
+    </dgm:linClrLst>
+    <dgm:effectClrLst/>
+    <dgm:txLinClrLst/>
+    <dgm:txFillClrLst meth="repeat">
+      <a:schemeClr val="lt1"/>
+    </dgm:txFillClrLst>
+    <dgm:txEffectClrLst/>
+  </dgm:styleLbl>
+  <dgm:styleLbl name="bgImgPlace1">
+    <dgm:fillClrLst meth="repeat">
+      <a:schemeClr val="accent1">
+        <a:tint val="50000"/>
+      </a:schemeClr>
+    </dgm:fillClrLst>
+    <dgm:linClrLst meth="repeat">
+      <a:schemeClr val="lt1"/>
+    </dgm:linClrLst>
+    <dgm:effectClrLst/>
+    <dgm:txLinClrLst/>
+    <dgm:txFillClrLst meth="repeat">
+      <a:schemeClr val="lt1"/>
+    </dgm:txFillClrLst>
+    <dgm:txEffectClrLst/>
+  </dgm:styleLbl>
+  <dgm:styleLbl name="sibTrans2D1">
+    <dgm:fillClrLst meth="repeat">
+      <a:schemeClr val="accent1">
+        <a:tint val="60000"/>
+      </a:schemeClr>
+    </dgm:fillClrLst>
+    <dgm:linClrLst meth="repeat">
+      <a:schemeClr val="accent1">
+        <a:tint val="60000"/>
+      </a:schemeClr>
+    </dgm:linClrLst>
+    <dgm:effectClrLst/>
+    <dgm:txLinClrLst/>
+    <dgm:txFillClrLst/>
+    <dgm:txEffectClrLst/>
+  </dgm:styleLbl>
+  <dgm:styleLbl name="fgSibTrans2D1">
+    <dgm:fillClrLst meth="repeat">
+      <a:schemeClr val="accent1">
+        <a:tint val="60000"/>
+      </a:schemeClr>
+    </dgm:fillClrLst>
+    <dgm:linClrLst meth="repeat">
+      <a:schemeClr val="accent1">
+        <a:tint val="60000"/>
+      </a:schemeClr>
+    </dgm:linClrLst>
+    <dgm:effectClrLst/>
+    <dgm:txLinClrLst/>
+    <dgm:txFillClrLst/>
+    <dgm:txEffectClrLst/>
+  </dgm:styleLbl>
+  <dgm:styleLbl name="bgSibTrans2D1">
+    <dgm:fillClrLst meth="repeat">
+      <a:schemeClr val="accent1">
+        <a:tint val="60000"/>
+      </a:schemeClr>
+    </dgm:fillClrLst>
+    <dgm:linClrLst meth="repeat">
+      <a:schemeClr val="accent1">
+        <a:tint val="60000"/>
+      </a:schemeClr>
+    </dgm:linClrLst>
+    <dgm:effectClrLst/>
+    <dgm:txLinClrLst/>
+    <dgm:txFillClrLst/>
+    <dgm:txEffectClrLst/>
+  </dgm:styleLbl>
+  <dgm:styleLbl name="sibTrans1D1">
+    <dgm:fillClrLst meth="repeat">
+      <a:schemeClr val="accent1"/>
+    </dgm:fillClrLst>
+    <dgm:linClrLst meth="repeat">
+      <a:schemeClr val="accent1"/>
+    </dgm:linClrLst>
+    <dgm:effectClrLst/>
+    <dgm:txLinClrLst/>
+    <dgm:txFillClrLst meth="repeat">
+      <a:schemeClr val="tx1"/>
+    </dgm:txFillClrLst>
+    <dgm:txEffectClrLst/>
+  </dgm:styleLbl>
+  <dgm:styleLbl name="callout">
+    <dgm:fillClrLst meth="repeat">
+      <a:schemeClr val="accent1"/>
+    </dgm:fillClrLst>
+    <dgm:linClrLst meth="repeat">
+      <a:schemeClr val="accent1">
+        <a:tint val="50000"/>
+      </a:schemeClr>
+    </dgm:linClrLst>
+    <dgm:effectClrLst/>
+    <dgm:txLinClrLst/>
+    <dgm:txFillClrLst meth="repeat">
+      <a:schemeClr val="tx1"/>
+    </dgm:txFillClrLst>
+    <dgm:txEffectClrLst/>
+  </dgm:styleLbl>
+  <dgm:styleLbl name="asst0">
+    <dgm:fillClrLst meth="repeat">
+      <a:schemeClr val="accent1"/>
+    </dgm:fillClrLst>
+    <dgm:linClrLst meth="repeat">
+      <a:schemeClr val="lt1"/>
+    </dgm:linClrLst>
+    <dgm:effectClrLst/>
+    <dgm:txLinClrLst/>
+    <dgm:txFillClrLst/>
+    <dgm:txEffectClrLst/>
+  </dgm:styleLbl>
+  <dgm:styleLbl name="asst1">
+    <dgm:fillClrLst meth="repeat">
+      <a:schemeClr val="accent1"/>
+    </dgm:fillClrLst>
+    <dgm:linClrLst meth="repeat">
+      <a:schemeClr val="lt1"/>
+    </dgm:linClrLst>
+    <dgm:effectClrLst/>
+    <dgm:txLinClrLst/>
+    <dgm:txFillClrLst/>
+    <dgm:txEffectClrLst/>
+  </dgm:styleLbl>
+  <dgm:styleLbl name="asst2">
+    <dgm:fillClrLst meth="repeat">
+      <a:schemeClr val="accent1"/>
+    </dgm:fillClrLst>
+    <dgm:linClrLst meth="repeat">
+      <a:schemeClr val="lt1"/>
+    </dgm:linClrLst>
+    <dgm:effectClrLst/>
+    <dgm:txLinClrLst/>
+    <dgm:txFillClrLst/>
+    <dgm:txEffectClrLst/>
+  </dgm:styleLbl>
+  <dgm:styleLbl name="asst3">
+    <dgm:fillClrLst meth="repeat">
+      <a:schemeClr val="accent1"/>
+    </dgm:fillClrLst>
+    <dgm:linClrLst meth="repeat">
+      <a:schemeClr val="lt1"/>
+    </dgm:linClrLst>
+    <dgm:effectClrLst/>
+    <dgm:txLinClrLst/>
+    <dgm:txFillClrLst/>
+    <dgm:txEffectClrLst/>
+  </dgm:styleLbl>
+  <dgm:styleLbl name="asst4">
+    <dgm:fillClrLst meth="repeat">
+      <a:schemeClr val="accent1"/>
+    </dgm:fillClrLst>
+    <dgm:linClrLst meth="repeat">
+      <a:schemeClr val="lt1"/>
+    </dgm:linClrLst>
+    <dgm:effectClrLst/>
+    <dgm:txLinClrLst/>
+    <dgm:txFillClrLst/>
+    <dgm:txEffectClrLst/>
+  </dgm:styleLbl>
+  <dgm:styleLbl name="parChTrans2D1">
+    <dgm:fillClrLst meth="repeat">
+      <a:schemeClr val="accent1">
+        <a:tint val="60000"/>
+      </a:schemeClr>
+    </dgm:fillClrLst>
+    <dgm:linClrLst meth="repeat">
+      <a:schemeClr val="accent1">
+        <a:tint val="60000"/>
+      </a:schemeClr>
+    </dgm:linClrLst>
+    <dgm:effectClrLst/>
+    <dgm:txLinClrLst/>
+    <dgm:txFillClrLst meth="repeat">
+      <a:schemeClr val="lt1"/>
+    </dgm:txFillClrLst>
+    <dgm:txEffectClrLst/>
+  </dgm:styleLbl>
+  <dgm:styleLbl name="parChTrans2D2">
+    <dgm:fillClrLst meth="repeat">
+      <a:schemeClr val="accent1"/>
+    </dgm:fillClrLst>
+    <dgm:linClrLst meth="repeat">
+      <a:schemeClr val="accent1"/>
+    </dgm:linClrLst>
+    <dgm:effectClrLst/>
+    <dgm:txLinClrLst/>
+    <dgm:txFillClrLst meth="repeat">
+      <a:schemeClr val="lt1"/>
+    </dgm:txFillClrLst>
+    <dgm:txEffectClrLst/>
+  </dgm:styleLbl>
+  <dgm:styleLbl name="parChTrans2D3">
+    <dgm:fillClrLst meth="repeat">
+      <a:schemeClr val="accent1"/>
+    </dgm:fillClrLst>
+    <dgm:linClrLst meth="repeat">
+      <a:schemeClr val="accent1"/>
+    </dgm:linClrLst>
+    <dgm:effectClrLst/>
+    <dgm:txLinClrLst/>
+    <dgm:txFillClrLst meth="repeat">
+      <a:schemeClr val="lt1"/>
+    </dgm:txFillClrLst>
+    <dgm:txEffectClrLst/>
+  </dgm:styleLbl>
+  <dgm:styleLbl name="parChTrans2D4">
+    <dgm:fillClrLst meth="repeat">
+      <a:schemeClr val="accent1"/>
+    </dgm:fillClrLst>
+    <dgm:linClrLst meth="repeat">
+      <a:schemeClr val="accent1"/>
+    </dgm:linClrLst>
+    <dgm:effectClrLst/>
+    <dgm:txLinClrLst/>
+    <dgm:txFillClrLst meth="repeat">
+      <a:schemeClr val="lt1"/>
+    </dgm:txFillClrLst>
+    <dgm:txEffectClrLst/>
+  </dgm:styleLbl>
+  <dgm:styleLbl name="parChTrans1D1">
+    <dgm:fillClrLst meth="repeat">
+      <a:schemeClr val="accent1"/>
+    </dgm:fillClrLst>
+    <dgm:linClrLst meth="repeat">
+      <a:schemeClr val="accent1">
+        <a:shade val="60000"/>
+      </a:schemeClr>
+    </dgm:linClrLst>
+    <dgm:effectClrLst/>
+    <dgm:txLinClrLst/>
+    <dgm:txFillClrLst meth="repeat">
+      <a:schemeClr val="tx1"/>
+    </dgm:txFillClrLst>
+    <dgm:txEffectClrLst/>
+  </dgm:styleLbl>
+  <dgm:styleLbl name="parChTrans1D2">
+    <dgm:fillClrLst meth="repeat">
+      <a:schemeClr val="accent1"/>
+    </dgm:fillClrLst>
+    <dgm:linClrLst meth="repeat">
+      <a:schemeClr val="accent1">
+        <a:shade val="60000"/>
+      </a:schemeClr>
+    </dgm:linClrLst>
+    <dgm:effectClrLst/>
+    <dgm:txLinClrLst/>
+    <dgm:txFillClrLst meth="repeat">
+      <a:schemeClr val="tx1"/>
+    </dgm:txFillClrLst>
+    <dgm:txEffectClrLst/>
+  </dgm:styleLbl>
+  <dgm:styleLbl name="parChTrans1D3">
+    <dgm:fillClrLst meth="repeat">
+      <a:schemeClr val="accent1"/>
+    </dgm:fillClrLst>
+    <dgm:linClrLst meth="repeat">
+      <a:schemeClr val="accent1">
+        <a:shade val="80000"/>
+      </a:schemeClr>
+    </dgm:linClrLst>
+    <dgm:effectClrLst/>
+    <dgm:txLinClrLst/>
+    <dgm:txFillClrLst meth="repeat">
+      <a:schemeClr val="tx1"/>
+    </dgm:txFillClrLst>
+    <dgm:txEffectClrLst/>
+  </dgm:styleLbl>
+  <dgm:styleLbl name="parChTrans1D4">
+    <dgm:fillClrLst meth="repeat">
+      <a:schemeClr val="accent1"/>
+    </dgm:fillClrLst>
+    <dgm:linClrLst meth="repeat">
+      <a:schemeClr val="accent1">
+        <a:shade val="80000"/>
+      </a:schemeClr>
+    </dgm:linClrLst>
+    <dgm:effectClrLst/>
+    <dgm:txLinClrLst/>
+    <dgm:txFillClrLst meth="repeat">
+      <a:schemeClr val="tx1"/>
+    </dgm:txFillClrLst>
+    <dgm:txEffectClrLst/>
+  </dgm:styleLbl>
+  <dgm:styleLbl name="fgAcc1">
+    <dgm:fillClrLst meth="repeat">
+      <a:schemeClr val="lt1">
+        <a:alpha val="90000"/>
+      </a:schemeClr>
+    </dgm:fillClrLst>
+    <dgm:linClrLst meth="repeat">
+      <a:schemeClr val="accent1"/>
+    </dgm:linClrLst>
+    <dgm:effectClrLst/>
+    <dgm:txLinClrLst/>
+    <dgm:txFillClrLst meth="repeat">
+      <a:schemeClr val="dk1"/>
+    </dgm:txFillClrLst>
+    <dgm:txEffectClrLst/>
+  </dgm:styleLbl>
+  <dgm:styleLbl name="conFgAcc1">
+    <dgm:fillClrLst meth="repeat">
+      <a:schemeClr val="lt1">
+        <a:alpha val="90000"/>
+      </a:schemeClr>
+    </dgm:fillClrLst>
+    <dgm:linClrLst meth="repeat">
+      <a:schemeClr val="accent1"/>
+    </dgm:linClrLst>
+    <dgm:effectClrLst/>
+    <dgm:txLinClrLst/>
+    <dgm:txFillClrLst meth="repeat">
+      <a:schemeClr val="dk1"/>
+    </dgm:txFillClrLst>
+    <dgm:txEffectClrLst/>
+  </dgm:styleLbl>
+  <dgm:styleLbl name="alignAcc1">
+    <dgm:fillClrLst meth="repeat">
+      <a:schemeClr val="lt1">
+        <a:alpha val="90000"/>
+      </a:schemeClr>
+    </dgm:fillClrLst>
+    <dgm:linClrLst meth="repeat">
+      <a:schemeClr val="accent1"/>
+    </dgm:linClrLst>
+    <dgm:effectClrLst/>
+    <dgm:txLinClrLst/>
+    <dgm:txFillClrLst meth="repeat">
+      <a:schemeClr val="dk1"/>
+    </dgm:txFillClrLst>
+    <dgm:txEffectClrLst/>
+  </dgm:styleLbl>
+  <dgm:styleLbl name="trAlignAcc1">
+    <dgm:fillClrLst meth="repeat">
+      <a:schemeClr val="lt1">
+        <a:alpha val="40000"/>
+      </a:schemeClr>
+    </dgm:fillClrLst>
+    <dgm:linClrLst meth="repeat">
+      <a:schemeClr val="accent1"/>
+    </dgm:linClrLst>
+    <dgm:effectClrLst/>
+    <dgm:txLinClrLst/>
+    <dgm:txFillClrLst meth="repeat">
+      <a:schemeClr val="dk1"/>
+    </dgm:txFillClrLst>
+    <dgm:txEffectClrLst/>
+  </dgm:styleLbl>
+  <dgm:styleLbl name="bgAcc1">
+    <dgm:fillClrLst meth="repeat">
+      <a:schemeClr val="lt1">
+        <a:alpha val="90000"/>
+      </a:schemeClr>
+    </dgm:fillClrLst>
+    <dgm:linClrLst meth="repeat">
+      <a:schemeClr val="accent1"/>
+    </dgm:linClrLst>
+    <dgm:effectClrLst/>
+    <dgm:txLinClrLst/>
+    <dgm:txFillClrLst meth="repeat">
+      <a:schemeClr val="dk1"/>
+    </dgm:txFillClrLst>
+    <dgm:txEffectClrLst/>
+  </dgm:styleLbl>
+  <dgm:styleLbl name="solidFgAcc1">
+    <dgm:fillClrLst meth="repeat">
+      <a:schemeClr val="lt1"/>
+    </dgm:fillClrLst>
+    <dgm:linClrLst meth="repeat">
+      <a:schemeClr val="accent1"/>
+    </dgm:linClrLst>
+    <dgm:effectClrLst/>
+    <dgm:txLinClrLst/>
+    <dgm:txFillClrLst meth="repeat">
+      <a:schemeClr val="dk1"/>
+    </dgm:txFillClrLst>
+    <dgm:txEffectClrLst/>
+  </dgm:styleLbl>
+  <dgm:styleLbl name="solidAlignAcc1">
+    <dgm:fillClrLst meth="repeat">
+      <a:schemeClr val="lt1"/>
+    </dgm:fillClrLst>
+    <dgm:linClrLst meth="repeat">
+      <a:schemeClr val="accent1"/>
+    </dgm:linClrLst>
+    <dgm:effectClrLst/>
+    <dgm:txLinClrLst/>
+    <dgm:txFillClrLst meth="repeat">
+      <a:schemeClr val="dk1"/>
+    </dgm:txFillClrLst>
+    <dgm:txEffectClrLst/>
+  </dgm:styleLbl>
+  <dgm:styleLbl name="solidBgAcc1">
+    <dgm:fillClrLst meth="repeat">
+      <a:schemeClr val="lt1"/>
+    </dgm:fillClrLst>
+    <dgm:linClrLst meth="repeat">
+      <a:schemeClr val="accent1"/>
+    </dgm:linClrLst>
+    <dgm:effectClrLst/>
+    <dgm:txLinClrLst/>
+    <dgm:txFillClrLst meth="repeat">
+      <a:schemeClr val="dk1"/>
+    </dgm:txFillClrLst>
+    <dgm:txEffectClrLst/>
+  </dgm:styleLbl>
+  <dgm:styleLbl name="fgAccFollowNode1">
+    <dgm:fillClrLst meth="repeat">
+      <a:schemeClr val="accent1">
+        <a:alpha val="90000"/>
+        <a:tint val="40000"/>
+      </a:schemeClr>
+    </dgm:fillClrLst>
+    <dgm:linClrLst meth="repeat">
+      <a:schemeClr val="accent1">
+        <a:alpha val="90000"/>
+        <a:tint val="40000"/>
+      </a:schemeClr>
+    </dgm:linClrLst>
+    <dgm:effectClrLst/>
+    <dgm:txLinClrLst/>
+    <dgm:txFillClrLst meth="repeat">
+      <a:schemeClr val="dk1"/>
+    </dgm:txFillClrLst>
+    <dgm:txEffectClrLst/>
+  </dgm:styleLbl>
+  <dgm:styleLbl name="alignAccFollowNode1">
+    <dgm:fillClrLst meth="repeat">
+      <a:schemeClr val="accent1">
+        <a:alpha val="90000"/>
+        <a:tint val="40000"/>
+      </a:schemeClr>
+    </dgm:fillClrLst>
+    <dgm:linClrLst meth="repeat">
+      <a:schemeClr val="accent1">
+        <a:alpha val="90000"/>
+        <a:tint val="40000"/>
+      </a:schemeClr>
+    </dgm:linClrLst>
+    <dgm:effectClrLst/>
+    <dgm:txLinClrLst/>
+    <dgm:txFillClrLst meth="repeat">
+      <a:schemeClr val="dk1"/>
+    </dgm:txFillClrLst>
+    <dgm:txEffectClrLst/>
+  </dgm:styleLbl>
+  <dgm:styleLbl name="bgAccFollowNode1">
+    <dgm:fillClrLst meth="repeat">
+      <a:schemeClr val="accent1">
+        <a:alpha val="90000"/>
+        <a:tint val="40000"/>
+      </a:schemeClr>
+    </dgm:fillClrLst>
+    <dgm:linClrLst meth="repeat">
+      <a:schemeClr val="accent1">
+        <a:alpha val="90000"/>
+        <a:tint val="40000"/>
+      </a:schemeClr>
+    </dgm:linClrLst>
+    <dgm:effectClrLst/>
+    <dgm:txLinClrLst/>
+    <dgm:txFillClrLst meth="repeat">
+      <a:schemeClr val="dk1"/>
+    </dgm:txFillClrLst>
+    <dgm:txEffectClrLst/>
+  </dgm:styleLbl>
+  <dgm:styleLbl name="fgAcc0">
+    <dgm:fillClrLst meth="repeat">
+      <a:schemeClr val="lt1">
+        <a:alpha val="90000"/>
+      </a:schemeClr>
+    </dgm:fillClrLst>
+    <dgm:linClrLst meth="repeat">
+      <a:schemeClr val="accent1"/>
+    </dgm:linClrLst>
+    <dgm:effectClrLst/>
+    <dgm:txLinClrLst/>
+    <dgm:txFillClrLst meth="repeat">
+      <a:schemeClr val="dk1"/>
+    </dgm:txFillClrLst>
+    <dgm:txEffectClrLst/>
+  </dgm:styleLbl>
+  <dgm:styleLbl name="fgAcc2">
+    <dgm:fillClrLst meth="repeat">
+      <a:schemeClr val="lt1">
+        <a:alpha val="90000"/>
+      </a:schemeClr>
+    </dgm:fillClrLst>
+    <dgm:linClrLst meth="repeat">
+      <a:schemeClr val="accent1"/>
+    </dgm:linClrLst>
+    <dgm:effectClrLst/>
+    <dgm:txLinClrLst/>
+    <dgm:txFillClrLst meth="repeat">
+      <a:schemeClr val="dk1"/>
+    </dgm:txFillClrLst>
+    <dgm:txEffectClrLst/>
+  </dgm:styleLbl>
+  <dgm:styleLbl name="fgAcc3">
+    <dgm:fillClrLst meth="repeat">
+      <a:schemeClr val="lt1">
+        <a:alpha val="90000"/>
+      </a:schemeClr>
+    </dgm:fillClrLst>
+    <dgm:linClrLst meth="repeat">
+      <a:schemeClr val="accent1"/>
+    </dgm:linClrLst>
+    <dgm:effectClrLst/>
+    <dgm:txLinClrLst/>
+    <dgm:txFillClrLst meth="repeat">
+      <a:schemeClr val="dk1"/>
+    </dgm:txFillClrLst>
+    <dgm:txEffectClrLst/>
+  </dgm:styleLbl>
+  <dgm:styleLbl name="fgAcc4">
+    <dgm:fillClrLst meth="repeat">
+      <a:schemeClr val="lt1">
+        <a:alpha val="90000"/>
+      </a:schemeClr>
+    </dgm:fillClrLst>
+    <dgm:linClrLst meth="repeat">
+      <a:schemeClr val="accent1"/>
+    </dgm:linClrLst>
+    <dgm:effectClrLst/>
+    <dgm:txLinClrLst/>
+    <dgm:txFillClrLst meth="repeat">
+      <a:schemeClr val="dk1"/>
+    </dgm:txFillClrLst>
+    <dgm:txEffectClrLst/>
+  </dgm:styleLbl>
+  <dgm:styleLbl name="bgShp">
+    <dgm:fillClrLst meth="repeat">
+      <a:schemeClr val="accent1">
+        <a:tint val="40000"/>
+      </a:schemeClr>
+    </dgm:fillClrLst>
+    <dgm:linClrLst meth="repeat">
+      <a:schemeClr val="accent1"/>
+    </dgm:linClrLst>
+    <dgm:effectClrLst/>
+    <dgm:txLinClrLst/>
+    <dgm:txFillClrLst meth="repeat">
+      <a:schemeClr val="dk1"/>
+    </dgm:txFillClrLst>
+    <dgm:txEffectClrLst/>
+  </dgm:styleLbl>
+  <dgm:styleLbl name="dkBgShp">
+    <dgm:fillClrLst meth="repeat">
+      <a:schemeClr val="accent1">
+        <a:shade val="80000"/>
+      </a:schemeClr>
+    </dgm:fillClrLst>
+    <dgm:linClrLst meth="repeat">
+      <a:schemeClr val="accent1"/>
+    </dgm:linClrLst>
+    <dgm:effectClrLst/>
+    <dgm:txLinClrLst/>
+    <dgm:txFillClrLst meth="repeat">
+      <a:schemeClr val="lt1"/>
+    </dgm:txFillClrLst>
+    <dgm:txEffectClrLst/>
+  </dgm:styleLbl>
+  <dgm:styleLbl name="trBgShp">
+    <dgm:fillClrLst meth="repeat">
+      <a:schemeClr val="accent1">
+        <a:tint val="50000"/>
+        <a:alpha val="40000"/>
+      </a:schemeClr>
+    </dgm:fillClrLst>
+    <dgm:linClrLst meth="repeat">
+      <a:schemeClr val="accent1"/>
+    </dgm:linClrLst>
+    <dgm:effectClrLst/>
+    <dgm:txLinClrLst/>
+    <dgm:txFillClrLst meth="repeat">
+      <a:schemeClr val="lt1"/>
+    </dgm:txFillClrLst>
+    <dgm:txEffectClrLst/>
+  </dgm:styleLbl>
+  <dgm:styleLbl name="fgShp">
+    <dgm:fillClrLst meth="repeat">
+      <a:schemeClr val="accent1">
+        <a:tint val="60000"/>
+      </a:schemeClr>
+    </dgm:fillClrLst>
+    <dgm:linClrLst meth="repeat">
+      <a:schemeClr val="lt1"/>
+    </dgm:linClrLst>
+    <dgm:effectClrLst/>
+    <dgm:txLinClrLst/>
+    <dgm:txFillClrLst meth="repeat">
+      <a:schemeClr val="dk1"/>
+    </dgm:txFillClrLst>
+    <dgm:txEffectClrLst/>
+  </dgm:styleLbl>
+  <dgm:styleLbl name="revTx">
+    <dgm:fillClrLst meth="repeat">
+      <a:schemeClr val="lt1">
+        <a:alpha val="0"/>
+      </a:schemeClr>
+    </dgm:fillClrLst>
+    <dgm:linClrLst meth="repeat">
+      <a:schemeClr val="dk1">
+        <a:alpha val="0"/>
+      </a:schemeClr>
+    </dgm:linClrLst>
+    <dgm:effectClrLst/>
+    <dgm:txLinClrLst/>
+    <dgm:txFillClrLst meth="repeat">
+      <a:schemeClr val="tx1"/>
+    </dgm:txFillClrLst>
+    <dgm:txEffectClrLst/>
+  </dgm:styleLbl>
+</dgm:colorsDef>
+</file>
+
+<file path=ppt/diagrams/data1.xml><?xml version="1.0" encoding="utf-8"?>
+<dgm:dataModel xmlns:dgm="http://schemas.openxmlformats.org/drawingml/2006/diagram" xmlns:a="http://schemas.openxmlformats.org/drawingml/2006/main">
+  <dgm:ptLst>
+    <dgm:pt modelId="{ED8EF73E-6CBC-45FB-AA2E-281E71969532}" type="doc">
+      <dgm:prSet loTypeId="urn:microsoft.com/office/officeart/2018/2/layout/IconLabelList" loCatId="icon" qsTypeId="urn:microsoft.com/office/officeart/2005/8/quickstyle/simple1" qsCatId="simple" csTypeId="urn:microsoft.com/office/officeart/2005/8/colors/accent1_2" csCatId="accent1" phldr="1"/>
+      <dgm:spPr/>
+      <dgm:t>
+        <a:bodyPr/>
+        <a:lstStyle/>
+        <a:p>
+          <a:endParaRPr lang="en-US"/>
+        </a:p>
+      </dgm:t>
+    </dgm:pt>
+    <dgm:pt modelId="{69DB2BD7-6AA0-420E-8CD6-622A931BB03D}">
+      <dgm:prSet/>
+      <dgm:spPr/>
+      <dgm:t>
+        <a:bodyPr/>
+        <a:lstStyle/>
+        <a:p>
+          <a:pPr>
+            <a:lnSpc>
+              <a:spcPct val="100000"/>
+            </a:lnSpc>
+          </a:pPr>
+          <a:r>
+            <a:rPr lang="en-US"/>
+            <a:t>Learning to use cloudflare worker and KV as cache</a:t>
+          </a:r>
+        </a:p>
+      </dgm:t>
+    </dgm:pt>
+    <dgm:pt modelId="{5AF9EB56-2765-454C-9A84-4EC3CA3BDCB8}" type="parTrans" cxnId="{ED087FAA-080B-4377-BEFA-13B9974FEC68}">
+      <dgm:prSet/>
+      <dgm:spPr/>
+      <dgm:t>
+        <a:bodyPr/>
+        <a:lstStyle/>
+        <a:p>
+          <a:endParaRPr lang="en-US"/>
+        </a:p>
+      </dgm:t>
+    </dgm:pt>
+    <dgm:pt modelId="{B0626B4F-1341-4E57-B4A6-3EFDF0B23F32}" type="sibTrans" cxnId="{ED087FAA-080B-4377-BEFA-13B9974FEC68}">
+      <dgm:prSet/>
+      <dgm:spPr/>
+      <dgm:t>
+        <a:bodyPr/>
+        <a:lstStyle/>
+        <a:p>
+          <a:endParaRPr lang="en-US"/>
+        </a:p>
+      </dgm:t>
+    </dgm:pt>
+    <dgm:pt modelId="{0745D882-83D1-4DC0-8952-89EF72A750E5}">
+      <dgm:prSet/>
+      <dgm:spPr/>
+      <dgm:t>
+        <a:bodyPr/>
+        <a:lstStyle/>
+        <a:p>
+          <a:pPr>
+            <a:lnSpc>
+              <a:spcPct val="100000"/>
+            </a:lnSpc>
+          </a:pPr>
+          <a:r>
+            <a:rPr lang="en-US"/>
+            <a:t>Understanding how MC components work under the hood</a:t>
+          </a:r>
+        </a:p>
+      </dgm:t>
+    </dgm:pt>
+    <dgm:pt modelId="{806CC622-7A95-4820-88A7-A5D0AA77658A}" type="parTrans" cxnId="{49180919-AF80-47F5-8994-0610559E89E1}">
+      <dgm:prSet/>
+      <dgm:spPr/>
+      <dgm:t>
+        <a:bodyPr/>
+        <a:lstStyle/>
+        <a:p>
+          <a:endParaRPr lang="en-US"/>
+        </a:p>
+      </dgm:t>
+    </dgm:pt>
+    <dgm:pt modelId="{10A10E4A-40E0-416A-8883-ECBCB43153BE}" type="sibTrans" cxnId="{49180919-AF80-47F5-8994-0610559E89E1}">
+      <dgm:prSet/>
+      <dgm:spPr/>
+      <dgm:t>
+        <a:bodyPr/>
+        <a:lstStyle/>
+        <a:p>
+          <a:endParaRPr lang="en-US"/>
+        </a:p>
+      </dgm:t>
+    </dgm:pt>
+    <dgm:pt modelId="{EBCB3F5C-5721-426C-80A4-412B29070F31}">
+      <dgm:prSet/>
+      <dgm:spPr/>
+      <dgm:t>
+        <a:bodyPr/>
+        <a:lstStyle/>
+        <a:p>
+          <a:pPr>
+            <a:lnSpc>
+              <a:spcPct val="100000"/>
+            </a:lnSpc>
+          </a:pPr>
+          <a:r>
+            <a:rPr lang="en-US"/>
+            <a:t>Designing proper cache key for tic tac toe use case</a:t>
+          </a:r>
+        </a:p>
+      </dgm:t>
+    </dgm:pt>
+    <dgm:pt modelId="{A258EBD3-C309-4743-AFEE-8757088F1017}" type="parTrans" cxnId="{20E7DA1B-03BA-4187-958F-2954C87416A9}">
+      <dgm:prSet/>
+      <dgm:spPr/>
+      <dgm:t>
+        <a:bodyPr/>
+        <a:lstStyle/>
+        <a:p>
+          <a:endParaRPr lang="en-US"/>
+        </a:p>
+      </dgm:t>
+    </dgm:pt>
+    <dgm:pt modelId="{2EF646E8-5C6A-4957-9B35-77FCF72DDD07}" type="sibTrans" cxnId="{20E7DA1B-03BA-4187-958F-2954C87416A9}">
+      <dgm:prSet/>
+      <dgm:spPr/>
+      <dgm:t>
+        <a:bodyPr/>
+        <a:lstStyle/>
+        <a:p>
+          <a:endParaRPr lang="en-US"/>
+        </a:p>
+      </dgm:t>
+    </dgm:pt>
+    <dgm:pt modelId="{F2ED5F2A-D4CB-476E-BF78-92798CC55F66}" type="pres">
+      <dgm:prSet presAssocID="{ED8EF73E-6CBC-45FB-AA2E-281E71969532}" presName="root" presStyleCnt="0">
+        <dgm:presLayoutVars>
+          <dgm:dir/>
+          <dgm:resizeHandles val="exact"/>
+        </dgm:presLayoutVars>
+      </dgm:prSet>
+      <dgm:spPr/>
+    </dgm:pt>
+    <dgm:pt modelId="{728260CD-B66B-4A2B-B6A6-7AE4BFC50F22}" type="pres">
+      <dgm:prSet presAssocID="{69DB2BD7-6AA0-420E-8CD6-622A931BB03D}" presName="compNode" presStyleCnt="0"/>
+      <dgm:spPr/>
+    </dgm:pt>
+    <dgm:pt modelId="{85A2F070-9216-4C63-923F-7BDF7C244EE6}" type="pres">
+      <dgm:prSet presAssocID="{69DB2BD7-6AA0-420E-8CD6-622A931BB03D}" presName="iconRect" presStyleLbl="node1" presStyleIdx="0" presStyleCnt="3"/>
+      <dgm:spPr>
+        <a:blipFill>
+          <a:blip xmlns:r="http://schemas.openxmlformats.org/officeDocument/2006/relationships" r:embed="rId1">
+            <a:extLst>
+              <a:ext uri="{28A0092B-C50C-407E-A947-70E740481C1C}">
+                <a14:useLocalDpi xmlns:a14="http://schemas.microsoft.com/office/drawing/2010/main" val="0"/>
+              </a:ext>
+              <a:ext uri="{96DAC541-7B7A-43D3-8B79-37D633B846F1}">
+                <asvg:svgBlip xmlns:asvg="http://schemas.microsoft.com/office/drawing/2016/SVG/main" r:embed="rId2"/>
+              </a:ext>
+            </a:extLst>
+          </a:blip>
+          <a:stretch>
+            <a:fillRect/>
+          </a:stretch>
+        </a:blipFill>
+      </dgm:spPr>
+      <dgm:extLst>
+        <a:ext uri="{E40237B7-FDA0-4F09-8148-C483321AD2D9}">
+          <dgm14:cNvPr xmlns:dgm14="http://schemas.microsoft.com/office/drawing/2010/diagram" id="0" name="" descr="User"/>
+        </a:ext>
+      </dgm:extLst>
+    </dgm:pt>
+    <dgm:pt modelId="{A6385486-6FAF-41B2-BEE0-B4823756F175}" type="pres">
+      <dgm:prSet presAssocID="{69DB2BD7-6AA0-420E-8CD6-622A931BB03D}" presName="spaceRect" presStyleCnt="0"/>
+      <dgm:spPr/>
+    </dgm:pt>
+    <dgm:pt modelId="{FCE90C1D-77DA-4FB9-B96D-F54560603F5C}" type="pres">
+      <dgm:prSet presAssocID="{69DB2BD7-6AA0-420E-8CD6-622A931BB03D}" presName="textRect" presStyleLbl="revTx" presStyleIdx="0" presStyleCnt="3">
+        <dgm:presLayoutVars>
+          <dgm:chMax val="1"/>
+          <dgm:chPref val="1"/>
+        </dgm:presLayoutVars>
+      </dgm:prSet>
+      <dgm:spPr/>
+    </dgm:pt>
+    <dgm:pt modelId="{84B92A43-A093-4535-B31F-49053C1D9900}" type="pres">
+      <dgm:prSet presAssocID="{B0626B4F-1341-4E57-B4A6-3EFDF0B23F32}" presName="sibTrans" presStyleCnt="0"/>
+      <dgm:spPr/>
+    </dgm:pt>
+    <dgm:pt modelId="{B865D1BC-0746-48C4-BE74-6E77FFDD1667}" type="pres">
+      <dgm:prSet presAssocID="{0745D882-83D1-4DC0-8952-89EF72A750E5}" presName="compNode" presStyleCnt="0"/>
+      <dgm:spPr/>
+    </dgm:pt>
+    <dgm:pt modelId="{0F3F5D70-CB72-4597-B7A0-086E950B8751}" type="pres">
+      <dgm:prSet presAssocID="{0745D882-83D1-4DC0-8952-89EF72A750E5}" presName="iconRect" presStyleLbl="node1" presStyleIdx="1" presStyleCnt="3"/>
+      <dgm:spPr>
+        <a:blipFill>
+          <a:blip xmlns:r="http://schemas.openxmlformats.org/officeDocument/2006/relationships" r:embed="rId3">
+            <a:extLst>
+              <a:ext uri="{28A0092B-C50C-407E-A947-70E740481C1C}">
+                <a14:useLocalDpi xmlns:a14="http://schemas.microsoft.com/office/drawing/2010/main" val="0"/>
+              </a:ext>
+              <a:ext uri="{96DAC541-7B7A-43D3-8B79-37D633B846F1}">
+                <asvg:svgBlip xmlns:asvg="http://schemas.microsoft.com/office/drawing/2016/SVG/main" r:embed="rId4"/>
+              </a:ext>
+            </a:extLst>
+          </a:blip>
+          <a:stretch>
+            <a:fillRect/>
+          </a:stretch>
+        </a:blipFill>
+      </dgm:spPr>
+      <dgm:extLst>
+        <a:ext uri="{E40237B7-FDA0-4F09-8148-C483321AD2D9}">
+          <dgm14:cNvPr xmlns:dgm14="http://schemas.microsoft.com/office/drawing/2010/diagram" id="0" name="" descr="Head with Gears"/>
+        </a:ext>
+      </dgm:extLst>
+    </dgm:pt>
+    <dgm:pt modelId="{7C4A6BEC-8C70-4430-B526-69F9C81BB050}" type="pres">
+      <dgm:prSet presAssocID="{0745D882-83D1-4DC0-8952-89EF72A750E5}" presName="spaceRect" presStyleCnt="0"/>
+      <dgm:spPr/>
+    </dgm:pt>
+    <dgm:pt modelId="{EB7E389F-65A2-4D4B-AC49-A721D9BFF27B}" type="pres">
+      <dgm:prSet presAssocID="{0745D882-83D1-4DC0-8952-89EF72A750E5}" presName="textRect" presStyleLbl="revTx" presStyleIdx="1" presStyleCnt="3">
+        <dgm:presLayoutVars>
+          <dgm:chMax val="1"/>
+          <dgm:chPref val="1"/>
+        </dgm:presLayoutVars>
+      </dgm:prSet>
+      <dgm:spPr/>
+    </dgm:pt>
+    <dgm:pt modelId="{F3D9029E-07F5-4B71-8013-835AB5C07D7C}" type="pres">
+      <dgm:prSet presAssocID="{10A10E4A-40E0-416A-8883-ECBCB43153BE}" presName="sibTrans" presStyleCnt="0"/>
+      <dgm:spPr/>
+    </dgm:pt>
+    <dgm:pt modelId="{377EFAE1-D2D7-4EB5-B2BC-C7385BBC0321}" type="pres">
+      <dgm:prSet presAssocID="{EBCB3F5C-5721-426C-80A4-412B29070F31}" presName="compNode" presStyleCnt="0"/>
+      <dgm:spPr/>
+    </dgm:pt>
+    <dgm:pt modelId="{C3013936-B85F-4983-84F3-B0487D75AE09}" type="pres">
+      <dgm:prSet presAssocID="{EBCB3F5C-5721-426C-80A4-412B29070F31}" presName="iconRect" presStyleLbl="node1" presStyleIdx="2" presStyleCnt="3"/>
+      <dgm:spPr>
+        <a:blipFill>
+          <a:blip xmlns:r="http://schemas.openxmlformats.org/officeDocument/2006/relationships" r:embed="rId5">
+            <a:extLst>
+              <a:ext uri="{28A0092B-C50C-407E-A947-70E740481C1C}">
+                <a14:useLocalDpi xmlns:a14="http://schemas.microsoft.com/office/drawing/2010/main" val="0"/>
+              </a:ext>
+              <a:ext uri="{96DAC541-7B7A-43D3-8B79-37D633B846F1}">
+                <asvg:svgBlip xmlns:asvg="http://schemas.microsoft.com/office/drawing/2016/SVG/main" r:embed="rId6"/>
+              </a:ext>
+            </a:extLst>
+          </a:blip>
+          <a:stretch>
+            <a:fillRect/>
+          </a:stretch>
+        </a:blipFill>
+      </dgm:spPr>
+      <dgm:extLst>
+        <a:ext uri="{E40237B7-FDA0-4F09-8148-C483321AD2D9}">
+          <dgm14:cNvPr xmlns:dgm14="http://schemas.microsoft.com/office/drawing/2010/diagram" id="0" name="" descr="Key"/>
+        </a:ext>
+      </dgm:extLst>
+    </dgm:pt>
+    <dgm:pt modelId="{D1ADFAA1-CB97-49B1-98C9-B3F85C1F4658}" type="pres">
+      <dgm:prSet presAssocID="{EBCB3F5C-5721-426C-80A4-412B29070F31}" presName="spaceRect" presStyleCnt="0"/>
+      <dgm:spPr/>
+    </dgm:pt>
+    <dgm:pt modelId="{A60748C1-7DA3-4367-AC38-76F83C828F25}" type="pres">
+      <dgm:prSet presAssocID="{EBCB3F5C-5721-426C-80A4-412B29070F31}" presName="textRect" presStyleLbl="revTx" presStyleIdx="2" presStyleCnt="3">
+        <dgm:presLayoutVars>
+          <dgm:chMax val="1"/>
+          <dgm:chPref val="1"/>
+        </dgm:presLayoutVars>
+      </dgm:prSet>
+      <dgm:spPr/>
+    </dgm:pt>
+  </dgm:ptLst>
+  <dgm:cxnLst>
+    <dgm:cxn modelId="{49180919-AF80-47F5-8994-0610559E89E1}" srcId="{ED8EF73E-6CBC-45FB-AA2E-281E71969532}" destId="{0745D882-83D1-4DC0-8952-89EF72A750E5}" srcOrd="1" destOrd="0" parTransId="{806CC622-7A95-4820-88A7-A5D0AA77658A}" sibTransId="{10A10E4A-40E0-416A-8883-ECBCB43153BE}"/>
+    <dgm:cxn modelId="{20E7DA1B-03BA-4187-958F-2954C87416A9}" srcId="{ED8EF73E-6CBC-45FB-AA2E-281E71969532}" destId="{EBCB3F5C-5721-426C-80A4-412B29070F31}" srcOrd="2" destOrd="0" parTransId="{A258EBD3-C309-4743-AFEE-8757088F1017}" sibTransId="{2EF646E8-5C6A-4957-9B35-77FCF72DDD07}"/>
+    <dgm:cxn modelId="{2BD08825-6B8C-48FD-95C3-A6565DEF3162}" type="presOf" srcId="{0745D882-83D1-4DC0-8952-89EF72A750E5}" destId="{EB7E389F-65A2-4D4B-AC49-A721D9BFF27B}" srcOrd="0" destOrd="0" presId="urn:microsoft.com/office/officeart/2018/2/layout/IconLabelList"/>
+    <dgm:cxn modelId="{B5588A5B-E607-4675-8D86-CDBD5F0BF757}" type="presOf" srcId="{EBCB3F5C-5721-426C-80A4-412B29070F31}" destId="{A60748C1-7DA3-4367-AC38-76F83C828F25}" srcOrd="0" destOrd="0" presId="urn:microsoft.com/office/officeart/2018/2/layout/IconLabelList"/>
+    <dgm:cxn modelId="{3758AEA4-7203-49D8-AF1C-3715E9DEC5CC}" type="presOf" srcId="{69DB2BD7-6AA0-420E-8CD6-622A931BB03D}" destId="{FCE90C1D-77DA-4FB9-B96D-F54560603F5C}" srcOrd="0" destOrd="0" presId="urn:microsoft.com/office/officeart/2018/2/layout/IconLabelList"/>
+    <dgm:cxn modelId="{ED087FAA-080B-4377-BEFA-13B9974FEC68}" srcId="{ED8EF73E-6CBC-45FB-AA2E-281E71969532}" destId="{69DB2BD7-6AA0-420E-8CD6-622A931BB03D}" srcOrd="0" destOrd="0" parTransId="{5AF9EB56-2765-454C-9A84-4EC3CA3BDCB8}" sibTransId="{B0626B4F-1341-4E57-B4A6-3EFDF0B23F32}"/>
+    <dgm:cxn modelId="{2B6A89E4-12A8-441B-BA33-76AB9D7E2F2E}" type="presOf" srcId="{ED8EF73E-6CBC-45FB-AA2E-281E71969532}" destId="{F2ED5F2A-D4CB-476E-BF78-92798CC55F66}" srcOrd="0" destOrd="0" presId="urn:microsoft.com/office/officeart/2018/2/layout/IconLabelList"/>
+    <dgm:cxn modelId="{F5DABF00-1988-47A3-BD59-1C97844F173D}" type="presParOf" srcId="{F2ED5F2A-D4CB-476E-BF78-92798CC55F66}" destId="{728260CD-B66B-4A2B-B6A6-7AE4BFC50F22}" srcOrd="0" destOrd="0" presId="urn:microsoft.com/office/officeart/2018/2/layout/IconLabelList"/>
+    <dgm:cxn modelId="{9D155BA6-C7AF-4DC7-84B7-8BA75878DFD4}" type="presParOf" srcId="{728260CD-B66B-4A2B-B6A6-7AE4BFC50F22}" destId="{85A2F070-9216-4C63-923F-7BDF7C244EE6}" srcOrd="0" destOrd="0" presId="urn:microsoft.com/office/officeart/2018/2/layout/IconLabelList"/>
+    <dgm:cxn modelId="{D5119D2A-F1D2-4C8C-8994-D18ADEBCEEC4}" type="presParOf" srcId="{728260CD-B66B-4A2B-B6A6-7AE4BFC50F22}" destId="{A6385486-6FAF-41B2-BEE0-B4823756F175}" srcOrd="1" destOrd="0" presId="urn:microsoft.com/office/officeart/2018/2/layout/IconLabelList"/>
+    <dgm:cxn modelId="{B3BB9953-07C2-48D6-B4D7-CB7A717C0B45}" type="presParOf" srcId="{728260CD-B66B-4A2B-B6A6-7AE4BFC50F22}" destId="{FCE90C1D-77DA-4FB9-B96D-F54560603F5C}" srcOrd="2" destOrd="0" presId="urn:microsoft.com/office/officeart/2018/2/layout/IconLabelList"/>
+    <dgm:cxn modelId="{C1BC5A85-51A7-4763-A197-F19CA2B93781}" type="presParOf" srcId="{F2ED5F2A-D4CB-476E-BF78-92798CC55F66}" destId="{84B92A43-A093-4535-B31F-49053C1D9900}" srcOrd="1" destOrd="0" presId="urn:microsoft.com/office/officeart/2018/2/layout/IconLabelList"/>
+    <dgm:cxn modelId="{EE8FBD4B-2BA7-4652-A393-A9ADA4CCAA84}" type="presParOf" srcId="{F2ED5F2A-D4CB-476E-BF78-92798CC55F66}" destId="{B865D1BC-0746-48C4-BE74-6E77FFDD1667}" srcOrd="2" destOrd="0" presId="urn:microsoft.com/office/officeart/2018/2/layout/IconLabelList"/>
+    <dgm:cxn modelId="{EAE49236-1BF2-4414-8CD8-979AFAA7CB57}" type="presParOf" srcId="{B865D1BC-0746-48C4-BE74-6E77FFDD1667}" destId="{0F3F5D70-CB72-4597-B7A0-086E950B8751}" srcOrd="0" destOrd="0" presId="urn:microsoft.com/office/officeart/2018/2/layout/IconLabelList"/>
+    <dgm:cxn modelId="{7DE7256E-E915-437F-BA7E-B12E6C6C3F2C}" type="presParOf" srcId="{B865D1BC-0746-48C4-BE74-6E77FFDD1667}" destId="{7C4A6BEC-8C70-4430-B526-69F9C81BB050}" srcOrd="1" destOrd="0" presId="urn:microsoft.com/office/officeart/2018/2/layout/IconLabelList"/>
+    <dgm:cxn modelId="{45649207-F118-4080-8906-0B67BECDB30C}" type="presParOf" srcId="{B865D1BC-0746-48C4-BE74-6E77FFDD1667}" destId="{EB7E389F-65A2-4D4B-AC49-A721D9BFF27B}" srcOrd="2" destOrd="0" presId="urn:microsoft.com/office/officeart/2018/2/layout/IconLabelList"/>
+    <dgm:cxn modelId="{4490CCA8-E5B5-4422-8638-DC02905CD60D}" type="presParOf" srcId="{F2ED5F2A-D4CB-476E-BF78-92798CC55F66}" destId="{F3D9029E-07F5-4B71-8013-835AB5C07D7C}" srcOrd="3" destOrd="0" presId="urn:microsoft.com/office/officeart/2018/2/layout/IconLabelList"/>
+    <dgm:cxn modelId="{75CE1893-D066-4EED-B8F5-616F3A0FDC0F}" type="presParOf" srcId="{F2ED5F2A-D4CB-476E-BF78-92798CC55F66}" destId="{377EFAE1-D2D7-4EB5-B2BC-C7385BBC0321}" srcOrd="4" destOrd="0" presId="urn:microsoft.com/office/officeart/2018/2/layout/IconLabelList"/>
+    <dgm:cxn modelId="{7F8A7DA1-F0B2-4845-8DFB-AD3618D907A5}" type="presParOf" srcId="{377EFAE1-D2D7-4EB5-B2BC-C7385BBC0321}" destId="{C3013936-B85F-4983-84F3-B0487D75AE09}" srcOrd="0" destOrd="0" presId="urn:microsoft.com/office/officeart/2018/2/layout/IconLabelList"/>
+    <dgm:cxn modelId="{B4BFF19D-731F-4FCC-B954-7F76F1485666}" type="presParOf" srcId="{377EFAE1-D2D7-4EB5-B2BC-C7385BBC0321}" destId="{D1ADFAA1-CB97-49B1-98C9-B3F85C1F4658}" srcOrd="1" destOrd="0" presId="urn:microsoft.com/office/officeart/2018/2/layout/IconLabelList"/>
+    <dgm:cxn modelId="{9FCD4393-A342-4A75-BF68-D0E919D2445A}" type="presParOf" srcId="{377EFAE1-D2D7-4EB5-B2BC-C7385BBC0321}" destId="{A60748C1-7DA3-4367-AC38-76F83C828F25}" srcOrd="2" destOrd="0" presId="urn:microsoft.com/office/officeart/2018/2/layout/IconLabelList"/>
+  </dgm:cxnLst>
+  <dgm:bg/>
+  <dgm:whole/>
+  <dgm:extLst>
+    <a:ext uri="http://schemas.microsoft.com/office/drawing/2008/diagram">
+      <dsp:dataModelExt xmlns:dsp="http://schemas.microsoft.com/office/drawing/2008/diagram" relId="rId8" minVer="http://schemas.openxmlformats.org/drawingml/2006/diagram"/>
+    </a:ext>
+  </dgm:extLst>
+</dgm:dataModel>
+</file>
+
+<file path=ppt/diagrams/drawing1.xml><?xml version="1.0" encoding="utf-8"?>
+<dsp:drawing xmlns:dgm="http://schemas.openxmlformats.org/drawingml/2006/diagram" xmlns:dsp="http://schemas.microsoft.com/office/drawing/2008/diagram" xmlns:a="http://schemas.openxmlformats.org/drawingml/2006/main">
+  <dsp:spTree>
+    <dsp:nvGrpSpPr>
+      <dsp:cNvPr id="0" name=""/>
+      <dsp:cNvGrpSpPr/>
+    </dsp:nvGrpSpPr>
+    <dsp:grpSpPr/>
+    <dsp:sp modelId="{85A2F070-9216-4C63-923F-7BDF7C244EE6}">
+      <dsp:nvSpPr>
+        <dsp:cNvPr id="0" name=""/>
+        <dsp:cNvSpPr/>
+      </dsp:nvSpPr>
+      <dsp:spPr>
+        <a:xfrm>
+          <a:off x="491117" y="779224"/>
+          <a:ext cx="802880" cy="802880"/>
+        </a:xfrm>
+        <a:prstGeom prst="rect">
+          <a:avLst/>
+        </a:prstGeom>
+        <a:blipFill>
+          <a:blip xmlns:r="http://schemas.openxmlformats.org/officeDocument/2006/relationships" r:embed="rId1">
+            <a:extLst>
+              <a:ext uri="{28A0092B-C50C-407E-A947-70E740481C1C}">
+                <a14:useLocalDpi xmlns:a14="http://schemas.microsoft.com/office/drawing/2010/main" val="0"/>
+              </a:ext>
+              <a:ext uri="{96DAC541-7B7A-43D3-8B79-37D633B846F1}">
+                <asvg:svgBlip xmlns:asvg="http://schemas.microsoft.com/office/drawing/2016/SVG/main" r:embed="rId2"/>
+              </a:ext>
+            </a:extLst>
+          </a:blip>
+          <a:stretch>
+            <a:fillRect/>
+          </a:stretch>
+        </a:blipFill>
+        <a:ln w="15875" cap="flat" cmpd="sng" algn="ctr">
+          <a:solidFill>
+            <a:schemeClr val="lt1">
+              <a:hueOff val="0"/>
+              <a:satOff val="0"/>
+              <a:lumOff val="0"/>
+              <a:alphaOff val="0"/>
+            </a:schemeClr>
+          </a:solidFill>
+          <a:prstDash val="solid"/>
+        </a:ln>
+        <a:effectLst/>
+      </dsp:spPr>
+      <dsp:style>
+        <a:lnRef idx="2">
+          <a:scrgbClr r="0" g="0" b="0"/>
+        </a:lnRef>
+        <a:fillRef idx="1">
+          <a:scrgbClr r="0" g="0" b="0"/>
+        </a:fillRef>
+        <a:effectRef idx="0">
+          <a:scrgbClr r="0" g="0" b="0"/>
+        </a:effectRef>
+        <a:fontRef idx="minor">
+          <a:schemeClr val="lt1"/>
+        </a:fontRef>
+      </dsp:style>
+    </dsp:sp>
+    <dsp:sp modelId="{FCE90C1D-77DA-4FB9-B96D-F54560603F5C}">
+      <dsp:nvSpPr>
+        <dsp:cNvPr id="0" name=""/>
+        <dsp:cNvSpPr/>
+      </dsp:nvSpPr>
+      <dsp:spPr>
+        <a:xfrm>
+          <a:off x="468" y="1849851"/>
+          <a:ext cx="1784179" cy="713671"/>
+        </a:xfrm>
+        <a:prstGeom prst="rect">
+          <a:avLst/>
+        </a:prstGeom>
+        <a:noFill/>
+        <a:ln>
+          <a:noFill/>
+        </a:ln>
+        <a:effectLst/>
+      </dsp:spPr>
+      <dsp:style>
+        <a:lnRef idx="0">
+          <a:scrgbClr r="0" g="0" b="0"/>
+        </a:lnRef>
+        <a:fillRef idx="0">
+          <a:scrgbClr r="0" g="0" b="0"/>
+        </a:fillRef>
+        <a:effectRef idx="0">
+          <a:scrgbClr r="0" g="0" b="0"/>
+        </a:effectRef>
+        <a:fontRef idx="minor"/>
+      </dsp:style>
+      <dsp:txBody>
+        <a:bodyPr spcFirstLastPara="0" vert="horz" wrap="square" lIns="0" tIns="0" rIns="0" bIns="0" numCol="1" spcCol="1270" anchor="t" anchorCtr="0">
+          <a:noAutofit/>
+        </a:bodyPr>
+        <a:lstStyle/>
+        <a:p>
+          <a:pPr marL="0" lvl="0" indent="0" algn="ctr" defTabSz="711200">
+            <a:lnSpc>
+              <a:spcPct val="100000"/>
+            </a:lnSpc>
+            <a:spcBef>
+              <a:spcPct val="0"/>
+            </a:spcBef>
+            <a:spcAft>
+              <a:spcPct val="35000"/>
+            </a:spcAft>
+            <a:buNone/>
+          </a:pPr>
+          <a:r>
+            <a:rPr lang="en-US" sz="1600" kern="1200"/>
+            <a:t>Learning to use cloudflare worker and KV as cache</a:t>
+          </a:r>
+        </a:p>
+      </dsp:txBody>
+      <dsp:txXfrm>
+        <a:off x="468" y="1849851"/>
+        <a:ext cx="1784179" cy="713671"/>
+      </dsp:txXfrm>
+    </dsp:sp>
+    <dsp:sp modelId="{0F3F5D70-CB72-4597-B7A0-086E950B8751}">
+      <dsp:nvSpPr>
+        <dsp:cNvPr id="0" name=""/>
+        <dsp:cNvSpPr/>
+      </dsp:nvSpPr>
+      <dsp:spPr>
+        <a:xfrm>
+          <a:off x="2587528" y="779224"/>
+          <a:ext cx="802880" cy="802880"/>
+        </a:xfrm>
+        <a:prstGeom prst="rect">
+          <a:avLst/>
+        </a:prstGeom>
+        <a:blipFill>
+          <a:blip xmlns:r="http://schemas.openxmlformats.org/officeDocument/2006/relationships" r:embed="rId3">
+            <a:extLst>
+              <a:ext uri="{28A0092B-C50C-407E-A947-70E740481C1C}">
+                <a14:useLocalDpi xmlns:a14="http://schemas.microsoft.com/office/drawing/2010/main" val="0"/>
+              </a:ext>
+              <a:ext uri="{96DAC541-7B7A-43D3-8B79-37D633B846F1}">
+                <asvg:svgBlip xmlns:asvg="http://schemas.microsoft.com/office/drawing/2016/SVG/main" r:embed="rId4"/>
+              </a:ext>
+            </a:extLst>
+          </a:blip>
+          <a:stretch>
+            <a:fillRect/>
+          </a:stretch>
+        </a:blipFill>
+        <a:ln w="15875" cap="flat" cmpd="sng" algn="ctr">
+          <a:solidFill>
+            <a:schemeClr val="lt1">
+              <a:hueOff val="0"/>
+              <a:satOff val="0"/>
+              <a:lumOff val="0"/>
+              <a:alphaOff val="0"/>
+            </a:schemeClr>
+          </a:solidFill>
+          <a:prstDash val="solid"/>
+        </a:ln>
+        <a:effectLst/>
+      </dsp:spPr>
+      <dsp:style>
+        <a:lnRef idx="2">
+          <a:scrgbClr r="0" g="0" b="0"/>
+        </a:lnRef>
+        <a:fillRef idx="1">
+          <a:scrgbClr r="0" g="0" b="0"/>
+        </a:fillRef>
+        <a:effectRef idx="0">
+          <a:scrgbClr r="0" g="0" b="0"/>
+        </a:effectRef>
+        <a:fontRef idx="minor">
+          <a:schemeClr val="lt1"/>
+        </a:fontRef>
+      </dsp:style>
+    </dsp:sp>
+    <dsp:sp modelId="{EB7E389F-65A2-4D4B-AC49-A721D9BFF27B}">
+      <dsp:nvSpPr>
+        <dsp:cNvPr id="0" name=""/>
+        <dsp:cNvSpPr/>
+      </dsp:nvSpPr>
+      <dsp:spPr>
+        <a:xfrm>
+          <a:off x="2096879" y="1849851"/>
+          <a:ext cx="1784179" cy="713671"/>
+        </a:xfrm>
+        <a:prstGeom prst="rect">
+          <a:avLst/>
+        </a:prstGeom>
+        <a:noFill/>
+        <a:ln>
+          <a:noFill/>
+        </a:ln>
+        <a:effectLst/>
+      </dsp:spPr>
+      <dsp:style>
+        <a:lnRef idx="0">
+          <a:scrgbClr r="0" g="0" b="0"/>
+        </a:lnRef>
+        <a:fillRef idx="0">
+          <a:scrgbClr r="0" g="0" b="0"/>
+        </a:fillRef>
+        <a:effectRef idx="0">
+          <a:scrgbClr r="0" g="0" b="0"/>
+        </a:effectRef>
+        <a:fontRef idx="minor"/>
+      </dsp:style>
+      <dsp:txBody>
+        <a:bodyPr spcFirstLastPara="0" vert="horz" wrap="square" lIns="0" tIns="0" rIns="0" bIns="0" numCol="1" spcCol="1270" anchor="t" anchorCtr="0">
+          <a:noAutofit/>
+        </a:bodyPr>
+        <a:lstStyle/>
+        <a:p>
+          <a:pPr marL="0" lvl="0" indent="0" algn="ctr" defTabSz="711200">
+            <a:lnSpc>
+              <a:spcPct val="100000"/>
+            </a:lnSpc>
+            <a:spcBef>
+              <a:spcPct val="0"/>
+            </a:spcBef>
+            <a:spcAft>
+              <a:spcPct val="35000"/>
+            </a:spcAft>
+            <a:buNone/>
+          </a:pPr>
+          <a:r>
+            <a:rPr lang="en-US" sz="1600" kern="1200"/>
+            <a:t>Understanding how MC components work under the hood</a:t>
+          </a:r>
+        </a:p>
+      </dsp:txBody>
+      <dsp:txXfrm>
+        <a:off x="2096879" y="1849851"/>
+        <a:ext cx="1784179" cy="713671"/>
+      </dsp:txXfrm>
+    </dsp:sp>
+    <dsp:sp modelId="{C3013936-B85F-4983-84F3-B0487D75AE09}">
+      <dsp:nvSpPr>
+        <dsp:cNvPr id="0" name=""/>
+        <dsp:cNvSpPr/>
+      </dsp:nvSpPr>
+      <dsp:spPr>
+        <a:xfrm>
+          <a:off x="4683939" y="779224"/>
+          <a:ext cx="802880" cy="802880"/>
+        </a:xfrm>
+        <a:prstGeom prst="rect">
+          <a:avLst/>
+        </a:prstGeom>
+        <a:blipFill>
+          <a:blip xmlns:r="http://schemas.openxmlformats.org/officeDocument/2006/relationships" r:embed="rId5">
+            <a:extLst>
+              <a:ext uri="{28A0092B-C50C-407E-A947-70E740481C1C}">
+                <a14:useLocalDpi xmlns:a14="http://schemas.microsoft.com/office/drawing/2010/main" val="0"/>
+              </a:ext>
+              <a:ext uri="{96DAC541-7B7A-43D3-8B79-37D633B846F1}">
+                <asvg:svgBlip xmlns:asvg="http://schemas.microsoft.com/office/drawing/2016/SVG/main" r:embed="rId6"/>
+              </a:ext>
+            </a:extLst>
+          </a:blip>
+          <a:stretch>
+            <a:fillRect/>
+          </a:stretch>
+        </a:blipFill>
+        <a:ln w="15875" cap="flat" cmpd="sng" algn="ctr">
+          <a:solidFill>
+            <a:schemeClr val="lt1">
+              <a:hueOff val="0"/>
+              <a:satOff val="0"/>
+              <a:lumOff val="0"/>
+              <a:alphaOff val="0"/>
+            </a:schemeClr>
+          </a:solidFill>
+          <a:prstDash val="solid"/>
+        </a:ln>
+        <a:effectLst/>
+      </dsp:spPr>
+      <dsp:style>
+        <a:lnRef idx="2">
+          <a:scrgbClr r="0" g="0" b="0"/>
+        </a:lnRef>
+        <a:fillRef idx="1">
+          <a:scrgbClr r="0" g="0" b="0"/>
+        </a:fillRef>
+        <a:effectRef idx="0">
+          <a:scrgbClr r="0" g="0" b="0"/>
+        </a:effectRef>
+        <a:fontRef idx="minor">
+          <a:schemeClr val="lt1"/>
+        </a:fontRef>
+      </dsp:style>
+    </dsp:sp>
+    <dsp:sp modelId="{A60748C1-7DA3-4367-AC38-76F83C828F25}">
+      <dsp:nvSpPr>
+        <dsp:cNvPr id="0" name=""/>
+        <dsp:cNvSpPr/>
+      </dsp:nvSpPr>
+      <dsp:spPr>
+        <a:xfrm>
+          <a:off x="4193290" y="1849851"/>
+          <a:ext cx="1784179" cy="713671"/>
+        </a:xfrm>
+        <a:prstGeom prst="rect">
+          <a:avLst/>
+        </a:prstGeom>
+        <a:noFill/>
+        <a:ln>
+          <a:noFill/>
+        </a:ln>
+        <a:effectLst/>
+      </dsp:spPr>
+      <dsp:style>
+        <a:lnRef idx="0">
+          <a:scrgbClr r="0" g="0" b="0"/>
+        </a:lnRef>
+        <a:fillRef idx="0">
+          <a:scrgbClr r="0" g="0" b="0"/>
+        </a:fillRef>
+        <a:effectRef idx="0">
+          <a:scrgbClr r="0" g="0" b="0"/>
+        </a:effectRef>
+        <a:fontRef idx="minor"/>
+      </dsp:style>
+      <dsp:txBody>
+        <a:bodyPr spcFirstLastPara="0" vert="horz" wrap="square" lIns="0" tIns="0" rIns="0" bIns="0" numCol="1" spcCol="1270" anchor="t" anchorCtr="0">
+          <a:noAutofit/>
+        </a:bodyPr>
+        <a:lstStyle/>
+        <a:p>
+          <a:pPr marL="0" lvl="0" indent="0" algn="ctr" defTabSz="711200">
+            <a:lnSpc>
+              <a:spcPct val="100000"/>
+            </a:lnSpc>
+            <a:spcBef>
+              <a:spcPct val="0"/>
+            </a:spcBef>
+            <a:spcAft>
+              <a:spcPct val="35000"/>
+            </a:spcAft>
+            <a:buNone/>
+          </a:pPr>
+          <a:r>
+            <a:rPr lang="en-US" sz="1600" kern="1200"/>
+            <a:t>Designing proper cache key for tic tac toe use case</a:t>
+          </a:r>
+        </a:p>
+      </dsp:txBody>
+      <dsp:txXfrm>
+        <a:off x="4193290" y="1849851"/>
+        <a:ext cx="1784179" cy="713671"/>
+      </dsp:txXfrm>
+    </dsp:sp>
+  </dsp:spTree>
+</dsp:drawing>
+</file>
+
+<file path=ppt/diagrams/layout1.xml><?xml version="1.0" encoding="utf-8"?>
+<dgm:layoutDef xmlns:dgm="http://schemas.openxmlformats.org/drawingml/2006/diagram" xmlns:a="http://schemas.openxmlformats.org/drawingml/2006/main" uniqueId="urn:microsoft.com/office/officeart/2018/2/layout/IconLabelList">
+  <dgm:title val="Icon Label List"/>
+  <dgm:desc val="Use to show non-sequential or grouped chunks of information accompanied by a related visuals. Works best with icons or small pictures with short text captions."/>
+  <dgm:catLst>
+    <dgm:cat type="icon" pri="500"/>
+  </dgm:catLst>
+  <dgm:sampData useDef="1">
+    <dgm:dataModel>
+      <dgm:ptLst/>
+      <dgm:bg/>
+      <dgm:whole/>
+    </dgm:dataModel>
+  </dgm:sampData>
+  <dgm:styleData useDef="1">
+    <dgm:dataModel>
+      <dgm:ptLst/>
+      <dgm:bg/>
+      <dgm:whole/>
+    </dgm:dataModel>
+  </dgm:styleData>
+  <dgm:clrData useDef="1">
+    <dgm:dataModel>
+      <dgm:ptLst/>
+      <dgm:bg/>
+      <dgm:whole/>
+    </dgm:dataModel>
+  </dgm:clrData>
+  <dgm:layoutNode name="root">
+    <dgm:varLst>
+      <dgm:dir/>
+      <dgm:resizeHandles val="exact"/>
+    </dgm:varLst>
+    <dgm:choose name="Name0">
+      <dgm:if name="Name1" axis="self" func="var" arg="dir" op="equ" val="norm">
+        <dgm:alg type="snake">
+          <dgm:param type="grDir" val="tL"/>
+          <dgm:param type="flowDir" val="row"/>
+          <dgm:param type="contDir" val="sameDir"/>
+          <dgm:param type="off" val="ctr"/>
+          <dgm:param type="vertAlign" val="mid"/>
+          <dgm:param type="horzAlign" val="ctr"/>
+        </dgm:alg>
+      </dgm:if>
+      <dgm:else name="Name2">
+        <dgm:alg type="snake">
+          <dgm:param type="grDir" val="tR"/>
+          <dgm:param type="flowDir" val="row"/>
+          <dgm:param type="contDir" val="sameDir"/>
+          <dgm:param type="off" val="ctr"/>
+          <dgm:param type="vertAlign" val="mid"/>
+          <dgm:param type="horzAlign" val="ctr"/>
+        </dgm:alg>
+      </dgm:else>
+    </dgm:choose>
+    <dgm:shape xmlns:r="http://schemas.openxmlformats.org/officeDocument/2006/relationships" r:blip="">
+      <dgm:adjLst/>
+    </dgm:shape>
+    <dgm:presOf/>
+    <dgm:choose name="Name3">
+      <dgm:if name="Name4" axis="ch" ptType="node" func="cnt" op="lte" val="2">
+        <dgm:constrLst>
+          <dgm:constr type="h" for="ch" forName="compNode" refType="h" fact="0.4"/>
+          <dgm:constr type="w" for="ch" forName="compNode" val="120"/>
+          <dgm:constr type="w" for="ch" forName="sibTrans" refType="w" refFor="ch" refForName="compNode" fact="0.175"/>
+          <dgm:constr type="sp" refType="w" refFor="ch" refForName="compNode" op="equ" fact="0.25"/>
+          <dgm:constr type="primFontSz" for="des" ptType="node" op="equ" val="50"/>
+          <dgm:constr type="h" for="des" forName="compNode" op="equ"/>
+          <dgm:constr type="h" for="des" forName="textRect" op="equ"/>
+        </dgm:constrLst>
+      </dgm:if>
+      <dgm:if name="Name5" axis="ch" ptType="node" func="cnt" op="lte" val="4">
+        <dgm:constrLst>
+          <dgm:constr type="h" for="ch" forName="compNode" refType="h" fact="0.4"/>
+          <dgm:constr type="w" for="ch" forName="compNode" refType="w"/>
+          <dgm:constr type="w" for="ch" forName="sibTrans" refType="w" refFor="ch" refForName="compNode" fact="0.175"/>
+          <dgm:constr type="sp" refType="w" refFor="ch" refForName="compNode" op="equ" fact="0.25"/>
+          <dgm:constr type="primFontSz" for="des" ptType="node" op="equ" val="36"/>
+          <dgm:constr type="h" for="des" forName="compNode" op="equ"/>
+          <dgm:constr type="h" for="des" forName="textRect" op="equ"/>
+        </dgm:constrLst>
+      </dgm:if>
+      <dgm:else name="Name6">
+        <dgm:constrLst>
+          <dgm:constr type="h" for="ch" forName="compNode" refType="h" fact="0.4"/>
+          <dgm:constr type="w" for="ch" forName="compNode" refType="w"/>
+          <dgm:constr type="w" for="ch" forName="sibTrans" refType="w" refFor="ch" refForName="compNode" fact="0.175"/>
+          <dgm:constr type="sp" refType="w" refFor="ch" refForName="compNode" op="equ" fact="0.25"/>
+          <dgm:constr type="primFontSz" for="des" ptType="node" op="equ" val="24"/>
+          <dgm:constr type="h" for="des" forName="compNode" op="equ"/>
+          <dgm:constr type="h" for="des" forName="textRect" op="equ"/>
+        </dgm:constrLst>
+      </dgm:else>
+    </dgm:choose>
+    <dgm:ruleLst>
+      <dgm:rule type="w" for="ch" forName="compNode" val="50" fact="NaN" max="NaN"/>
+    </dgm:ruleLst>
+    <dgm:forEach name="Name7" axis="ch" ptType="node">
+      <dgm:layoutNode name="compNode">
+        <dgm:alg type="composite"/>
+        <dgm:shape xmlns:r="http://schemas.openxmlformats.org/officeDocument/2006/relationships" r:blip="">
+          <dgm:adjLst/>
+        </dgm:shape>
+        <dgm:presOf axis="self"/>
+        <dgm:constrLst>
+          <dgm:constr type="w" for="ch" forName="iconRect" refType="w" fact="0.45"/>
+          <dgm:constr type="h" for="ch" forName="iconRect" refType="w" refFor="ch" refForName="iconRect"/>
+          <dgm:constr type="ctrX" for="ch" forName="iconRect" refType="w" fact="0.5"/>
+          <dgm:constr type="t" for="ch" forName="iconRect"/>
+          <dgm:constr type="h" for="ch" forName="spaceRect" refType="h" fact="0.15"/>
+          <dgm:constr type="w" for="ch" forName="spaceRect" refType="w"/>
+          <dgm:constr type="l" for="ch" forName="spaceRect"/>
+          <dgm:constr type="t" for="ch" forName="spaceRect" refType="b" refFor="ch" refForName="iconRect"/>
+          <dgm:constr type="h" for="ch" forName="textRect" val="20"/>
+          <dgm:constr type="w" for="ch" forName="textRect" refType="w"/>
+          <dgm:constr type="l" for="ch" forName="textRect"/>
+          <dgm:constr type="t" for="ch" forName="textRect" refType="b" refFor="ch" refForName="spaceRect"/>
+        </dgm:constrLst>
+        <dgm:ruleLst>
+          <dgm:rule type="h" val="INF" fact="NaN" max="NaN"/>
+        </dgm:ruleLst>
+        <dgm:layoutNode name="iconRect" styleLbl="node1">
+          <dgm:alg type="sp"/>
+          <dgm:shape xmlns:r="http://schemas.openxmlformats.org/officeDocument/2006/relationships" type="rect" r:blip="" blipPhldr="1">
+            <dgm:adjLst/>
+          </dgm:shape>
+          <dgm:presOf/>
+          <dgm:constrLst/>
+          <dgm:ruleLst/>
+        </dgm:layoutNode>
+        <dgm:layoutNode name="spaceRect">
+          <dgm:alg type="sp"/>
+          <dgm:shape xmlns:r="http://schemas.openxmlformats.org/officeDocument/2006/relationships" r:blip="">
+            <dgm:adjLst/>
+          </dgm:shape>
+          <dgm:presOf/>
+          <dgm:constrLst/>
+          <dgm:ruleLst/>
+        </dgm:layoutNode>
+        <dgm:layoutNode name="textRect" styleLbl="revTx">
+          <dgm:varLst>
+            <dgm:chMax val="1"/>
+            <dgm:chPref val="1"/>
+          </dgm:varLst>
+          <dgm:alg type="tx">
+            <dgm:param type="txAnchorVert" val="t"/>
+          </dgm:alg>
+          <dgm:shape xmlns:r="http://schemas.openxmlformats.org/officeDocument/2006/relationships" type="rect" r:blip="">
+            <dgm:adjLst/>
+          </dgm:shape>
+          <dgm:presOf axis="self" ptType="node"/>
+          <dgm:constrLst>
+            <dgm:constr type="lMarg"/>
+            <dgm:constr type="rMarg"/>
+            <dgm:constr type="tMarg"/>
+            <dgm:constr type="bMarg"/>
+          </dgm:constrLst>
+          <dgm:ruleLst>
+            <dgm:rule type="primFontSz" val="11" fact="NaN" max="NaN"/>
+            <dgm:rule type="h" val="INF" fact="NaN" max="NaN"/>
+          </dgm:ruleLst>
+        </dgm:layoutNode>
+      </dgm:layoutNode>
+      <dgm:forEach name="Name8" axis="followSib" ptType="sibTrans" cnt="1">
+        <dgm:layoutNode name="sibTrans">
+          <dgm:alg type="sp"/>
+          <dgm:shape xmlns:r="http://schemas.openxmlformats.org/officeDocument/2006/relationships" r:blip="">
+            <dgm:adjLst/>
+          </dgm:shape>
+          <dgm:presOf axis="self"/>
+          <dgm:constrLst/>
+          <dgm:ruleLst/>
+        </dgm:layoutNode>
+      </dgm:forEach>
+    </dgm:forEach>
+  </dgm:layoutNode>
+  <dgm:extLst>
+    <a:ext uri="{68A01E43-0DF5-4B5B-8FA6-DAF915123BFB}">
+      <dgm1612:lstStyle xmlns:dgm1612="http://schemas.microsoft.com/office/drawing/2016/12/diagram">
+        <a:lvl1pPr>
+          <a:lnSpc>
+            <a:spcPct val="100000"/>
+          </a:lnSpc>
+        </a:lvl1pPr>
+      </dgm1612:lstStyle>
+    </a:ext>
+  </dgm:extLst>
+</dgm:layoutDef>
+</file>
+
+<file path=ppt/diagrams/quickStyle1.xml><?xml version="1.0" encoding="utf-8"?>
+<dgm:styleDef xmlns:dgm="http://schemas.openxmlformats.org/drawingml/2006/diagram" xmlns:a="http://schemas.openxmlformats.org/drawingml/2006/main" uniqueId="urn:microsoft.com/office/officeart/2005/8/quickstyle/simple1">
+  <dgm:title val=""/>
+  <dgm:desc val=""/>
+  <dgm:catLst>
+    <dgm:cat type="simple" pri="10100"/>
+  </dgm:catLst>
+  <dgm:scene3d>
+    <a:camera prst="orthographicFront"/>
+    <a:lightRig rig="threePt" dir="t"/>
+  </dgm:scene3d>
+  <dgm:styleLbl name="node0">
+    <dgm:scene3d>
+      <a:camera prst="orthographicFront"/>
+      <a:lightRig rig="threePt" dir="t"/>
+    </dgm:scene3d>
+    <dgm:sp3d/>
+    <dgm:txPr/>
+    <dgm:style>
+      <a:lnRef idx="2">
+        <a:scrgbClr r="0" g="0" b="0"/>
+      </a:lnRef>
+      <a:fillRef idx="1">
+        <a:scrgbClr r="0" g="0" b="0"/>
+      </a:fillRef>
+      <a:effectRef idx="0">
+        <a:scrgbClr r="0" g="0" b="0"/>
+      </a:effectRef>
+      <a:fontRef idx="minor">
+        <a:schemeClr val="lt1"/>
+      </a:fontRef>
+    </dgm:style>
+  </dgm:styleLbl>
+  <dgm:styleLbl name="lnNode1">
+    <dgm:scene3d>
+      <a:camera prst="orthographicFront"/>
+      <a:lightRig rig="threePt" dir="t"/>
+    </dgm:scene3d>
+    <dgm:sp3d/>
+    <dgm:txPr/>
+    <dgm:style>
+      <a:lnRef idx="2">
+        <a:scrgbClr r="0" g="0" b="0"/>
+      </a:lnRef>
+      <a:fillRef idx="1">
+        <a:scrgbClr r="0" g="0" b="0"/>
+      </a:fillRef>
+      <a:effectRef idx="0">
+        <a:scrgbClr r="0" g="0" b="0"/>
+      </a:effectRef>
+      <a:fontRef idx="minor">
+        <a:schemeClr val="lt1"/>
+      </a:fontRef>
+    </dgm:style>
+  </dgm:styleLbl>
+  <dgm:styleLbl name="vennNode1">
+    <dgm:scene3d>
+      <a:camera prst="orthographicFront"/>
+      <a:lightRig rig="threePt" dir="t"/>
+    </dgm:scene3d>
+    <dgm:sp3d/>
+    <dgm:txPr/>
+    <dgm:style>
+      <a:lnRef idx="2">
+        <a:scrgbClr r="0" g="0" b="0"/>
+      </a:lnRef>
+      <a:fillRef idx="1">
+        <a:scrgbClr r="0" g="0" b="0"/>
+      </a:fillRef>
+      <a:effectRef idx="0">
+        <a:scrgbClr r="0" g="0" b="0"/>
+      </a:effectRef>
+      <a:fontRef idx="minor">
+        <a:schemeClr val="tx1"/>
+      </a:fontRef>
+    </dgm:style>
+  </dgm:styleLbl>
+  <dgm:styleLbl name="alignNode1">
+    <dgm:scene3d>
+      <a:camera prst="orthographicFront"/>
+      <a:lightRig rig="threePt" dir="t"/>
+    </dgm:scene3d>
+    <dgm:sp3d/>
+    <dgm:txPr/>
+    <dgm:style>
+      <a:lnRef idx="2">
+        <a:scrgbClr r="0" g="0" b="0"/>
+      </a:lnRef>
+      <a:fillRef idx="1">
+        <a:scrgbClr r="0" g="0" b="0"/>
+      </a:fillRef>
+      <a:effectRef idx="0">
+        <a:scrgbClr r="0" g="0" b="0"/>
+      </a:effectRef>
+      <a:fontRef idx="minor">
+        <a:schemeClr val="lt1"/>
+      </a:fontRef>
+    </dgm:style>
+  </dgm:styleLbl>
+  <dgm:styleLbl name="node1">
+    <dgm:scene3d>
+      <a:camera prst="orthographicFront"/>
+      <a:lightRig rig="threePt" dir="t"/>
+    </dgm:scene3d>
+    <dgm:sp3d/>
+    <dgm:txPr/>
+    <dgm:style>
+      <a:lnRef idx="2">
+        <a:scrgbClr r="0" g="0" b="0"/>
+      </a:lnRef>
+      <a:fillRef idx="1">
+        <a:scrgbClr r="0" g="0" b="0"/>
+      </a:fillRef>
+      <a:effectRef idx="0">
+        <a:scrgbClr r="0" g="0" b="0"/>
+      </a:effectRef>
+      <a:fontRef idx="minor">
+        <a:schemeClr val="lt1"/>
+      </a:fontRef>
+    </dgm:style>
+  </dgm:styleLbl>
+  <dgm:styleLbl name="node2">
+    <dgm:scene3d>
+      <a:camera prst="orthographicFront"/>
+      <a:lightRig rig="threePt" dir="t"/>
+    </dgm:scene3d>
+    <dgm:sp3d/>
+    <dgm:txPr/>
+    <dgm:style>
+      <a:lnRef idx="2">
+        <a:scrgbClr r="0" g="0" b="0"/>
+      </a:lnRef>
+      <a:fillRef idx="1">
+        <a:scrgbClr r="0" g="0" b="0"/>
+      </a:fillRef>
+      <a:effectRef idx="0">
+        <a:scrgbClr r="0" g="0" b="0"/>
+      </a:effectRef>
+      <a:fontRef idx="minor">
+        <a:schemeClr val="lt1"/>
+      </a:fontRef>
+    </dgm:style>
+  </dgm:styleLbl>
+  <dgm:styleLbl name="node3">
+    <dgm:scene3d>
+      <a:camera prst="orthographicFront"/>
+      <a:lightRig rig="threePt" dir="t"/>
+    </dgm:scene3d>
+    <dgm:sp3d/>
+    <dgm:txPr/>
+    <dgm:style>
+      <a:lnRef idx="2">
+        <a:scrgbClr r="0" g="0" b="0"/>
+      </a:lnRef>
+      <a:fillRef idx="1">
+        <a:scrgbClr r="0" g="0" b="0"/>
+      </a:fillRef>
+      <a:effectRef idx="0">
+        <a:scrgbClr r="0" g="0" b="0"/>
+      </a:effectRef>
+      <a:fontRef idx="minor">
+        <a:schemeClr val="lt1"/>
+      </a:fontRef>
+    </dgm:style>
+  </dgm:styleLbl>
+  <dgm:styleLbl name="node4">
+    <dgm:scene3d>
+      <a:camera prst="orthographicFront"/>
+      <a:lightRig rig="threePt" dir="t"/>
+    </dgm:scene3d>
+    <dgm:sp3d/>
+    <dgm:txPr/>
+    <dgm:style>
+      <a:lnRef idx="2">
+        <a:scrgbClr r="0" g="0" b="0"/>
+      </a:lnRef>
+      <a:fillRef idx="1">
+        <a:scrgbClr r="0" g="0" b="0"/>
+      </a:fillRef>
+      <a:effectRef idx="0">
+        <a:scrgbClr r="0" g="0" b="0"/>
+      </a:effectRef>
+      <a:fontRef idx="minor">
+        <a:schemeClr val="lt1"/>
+      </a:fontRef>
+    </dgm:style>
+  </dgm:styleLbl>
+  <dgm:styleLbl name="fgImgPlace1">
+    <dgm:scene3d>
+      <a:camera prst="orthographicFront"/>
+      <a:lightRig rig="threePt" dir="t"/>
+    </dgm:scene3d>
+    <dgm:sp3d/>
+    <dgm:txPr/>
+    <dgm:style>
+      <a:lnRef idx="2">
+        <a:scrgbClr r="0" g="0" b="0"/>
+      </a:lnRef>
+      <a:fillRef idx="1">
+        <a:scrgbClr r="0" g="0" b="0"/>
+      </a:fillRef>
+      <a:effectRef idx="0">
+        <a:scrgbClr r="0" g="0" b="0"/>
+      </a:effectRef>
+      <a:fontRef idx="minor"/>
+    </dgm:style>
+  </dgm:styleLbl>
+  <dgm:styleLbl name="alignImgPlace1">
+    <dgm:scene3d>
+      <a:camera prst="orthographicFront"/>
+      <a:lightRig rig="threePt" dir="t"/>
+    </dgm:scene3d>
+    <dgm:sp3d/>
+    <dgm:txPr/>
+    <dgm:style>
+      <a:lnRef idx="2">
+        <a:scrgbClr r="0" g="0" b="0"/>
+      </a:lnRef>
+      <a:fillRef idx="1">
+        <a:scrgbClr r="0" g="0" b="0"/>
+      </a:fillRef>
+      <a:effectRef idx="0">
+        <a:scrgbClr r="0" g="0" b="0"/>
+      </a:effectRef>
+      <a:fontRef idx="minor"/>
+    </dgm:style>
+  </dgm:styleLbl>
+  <dgm:styleLbl name="bgImgPlace1">
+    <dgm:scene3d>
+      <a:camera prst="orthographicFront"/>
+      <a:lightRig rig="threePt" dir="t"/>
+    </dgm:scene3d>
+    <dgm:sp3d/>
+    <dgm:txPr/>
+    <dgm:style>
+      <a:lnRef idx="2">
+        <a:scrgbClr r="0" g="0" b="0"/>
+      </a:lnRef>
+      <a:fillRef idx="1">
+        <a:scrgbClr r="0" g="0" b="0"/>
+      </a:fillRef>
+      <a:effectRef idx="0">
+        <a:scrgbClr r="0" g="0" b="0"/>
+      </a:effectRef>
+      <a:fontRef idx="minor"/>
+    </dgm:style>
+  </dgm:styleLbl>
+  <dgm:styleLbl name="sibTrans2D1">
+    <dgm:scene3d>
+      <a:camera prst="orthographicFront"/>
+      <a:lightRig rig="threePt" dir="t"/>
+    </dgm:scene3d>
+    <dgm:sp3d/>
+    <dgm:txPr/>
+    <dgm:style>
+      <a:lnRef idx="0">
+        <a:scrgbClr r="0" g="0" b="0"/>
+      </a:lnRef>
+      <a:fillRef idx="1">
+        <a:scrgbClr r="0" g="0" b="0"/>
+      </a:fillRef>
+      <a:effectRef idx="0">
+        <a:scrgbClr r="0" g="0" b="0"/>
+      </a:effectRef>
+      <a:fontRef idx="minor">
+        <a:schemeClr val="lt1"/>
+      </a:fontRef>
+    </dgm:style>
+  </dgm:styleLbl>
+  <dgm:styleLbl name="fgSibTrans2D1">
+    <dgm:scene3d>
+      <a:camera prst="orthographicFront"/>
+      <a:lightRig rig="threePt" dir="t"/>
+    </dgm:scene3d>
+    <dgm:sp3d/>
+    <dgm:txPr/>
+    <dgm:style>
+      <a:lnRef idx="0">
+        <a:scrgbClr r="0" g="0" b="0"/>
+      </a:lnRef>
+      <a:fillRef idx="1">
+        <a:scrgbClr r="0" g="0" b="0"/>
+      </a:fillRef>
+      <a:effectRef idx="0">
+        <a:scrgbClr r="0" g="0" b="0"/>
+      </a:effectRef>
+      <a:fontRef idx="minor">
+        <a:schemeClr val="lt1"/>
+      </a:fontRef>
+    </dgm:style>
+  </dgm:styleLbl>
+  <dgm:styleLbl name="bgSibTrans2D1">
+    <dgm:scene3d>
+      <a:camera prst="orthographicFront"/>
+      <a:lightRig rig="threePt" dir="t"/>
+    </dgm:scene3d>
+    <dgm:sp3d/>
+    <dgm:txPr/>
+    <dgm:style>
+      <a:lnRef idx="0">
+        <a:scrgbClr r="0" g="0" b="0"/>
+      </a:lnRef>
+      <a:fillRef idx="1">
+        <a:scrgbClr r="0" g="0" b="0"/>
+      </a:fillRef>
+      <a:effectRef idx="0">
+        <a:scrgbClr r="0" g="0" b="0"/>
+      </a:effectRef>
+      <a:fontRef idx="minor">
+        <a:schemeClr val="lt1"/>
+      </a:fontRef>
+    </dgm:style>
+  </dgm:styleLbl>
+  <dgm:styleLbl name="sibTrans1D1">
+    <dgm:scene3d>
+      <a:camera prst="orthographicFront"/>
+      <a:lightRig rig="threePt" dir="t"/>
+    </dgm:scene3d>
+    <dgm:sp3d/>
+    <dgm:txPr/>
+    <dgm:style>
+      <a:lnRef idx="1">
+        <a:scrgbClr r="0" g="0" b="0"/>
+      </a:lnRef>
+      <a:fillRef idx="0">
+        <a:scrgbClr r="0" g="0" b="0"/>
+      </a:fillRef>
+      <a:effectRef idx="0">
+        <a:scrgbClr r="0" g="0" b="0"/>
+      </a:effectRef>
+      <a:fontRef idx="minor"/>
+    </dgm:style>
+  </dgm:styleLbl>
+  <dgm:styleLbl name="callout">
+    <dgm:scene3d>
+      <a:camera prst="orthographicFront"/>
+      <a:lightRig rig="threePt" dir="t"/>
+    </dgm:scene3d>
+    <dgm:sp3d/>
+    <dgm:txPr/>
+    <dgm:style>
+      <a:lnRef idx="2">
+        <a:scrgbClr r="0" g="0" b="0"/>
+      </a:lnRef>
+      <a:fillRef idx="1">
+        <a:scrgbClr r="0" g="0" b="0"/>
+      </a:fillRef>
+      <a:effectRef idx="0">
+        <a:scrgbClr r="0" g="0" b="0"/>
+      </a:effectRef>
+      <a:fontRef idx="minor"/>
+    </dgm:style>
+  </dgm:styleLbl>
+  <dgm:styleLbl name="asst0">
+    <dgm:scene3d>
+      <a:camera prst="orthographicFront"/>
+      <a:lightRig rig="threePt" dir="t"/>
+    </dgm:scene3d>
+    <dgm:sp3d/>
+    <dgm:txPr/>
+    <dgm:style>
+      <a:lnRef idx="2">
+        <a:scrgbClr r="0" g="0" b="0"/>
+      </a:lnRef>
+      <a:fillRef idx="1">
+        <a:scrgbClr r="0" g="0" b="0"/>
+      </a:fillRef>
+      <a:effectRef idx="0">
+        <a:scrgbClr r="0" g="0" b="0"/>
+      </a:effectRef>
+      <a:fontRef idx="minor">
+        <a:schemeClr val="lt1"/>
+      </a:fontRef>
+    </dgm:style>
+  </dgm:styleLbl>
+  <dgm:styleLbl name="asst1">
+    <dgm:scene3d>
+      <a:camera prst="orthographicFront"/>
+      <a:lightRig rig="threePt" dir="t"/>
+    </dgm:scene3d>
+    <dgm:sp3d/>
+    <dgm:txPr/>
+    <dgm:style>
+      <a:lnRef idx="2">
+        <a:scrgbClr r="0" g="0" b="0"/>
+      </a:lnRef>
+      <a:fillRef idx="1">
+        <a:scrgbClr r="0" g="0" b="0"/>
+      </a:fillRef>
+      <a:effectRef idx="0">
+        <a:scrgbClr r="0" g="0" b="0"/>
+      </a:effectRef>
+      <a:fontRef idx="minor">
+        <a:schemeClr val="lt1"/>
+      </a:fontRef>
+    </dgm:style>
+  </dgm:styleLbl>
+  <dgm:styleLbl name="asst2">
+    <dgm:scene3d>
+      <a:camera prst="orthographicFront"/>
+      <a:lightRig rig="threePt" dir="t"/>
+    </dgm:scene3d>
+    <dgm:sp3d/>
+    <dgm:txPr/>
+    <dgm:style>
+      <a:lnRef idx="2">
+        <a:scrgbClr r="0" g="0" b="0"/>
+      </a:lnRef>
+      <a:fillRef idx="1">
+        <a:scrgbClr r="0" g="0" b="0"/>
+      </a:fillRef>
+      <a:effectRef idx="0">
+        <a:scrgbClr r="0" g="0" b="0"/>
+      </a:effectRef>
+      <a:fontRef idx="minor">
+        <a:schemeClr val="lt1"/>
+      </a:fontRef>
+    </dgm:style>
+  </dgm:styleLbl>
+  <dgm:styleLbl name="asst3">
+    <dgm:scene3d>
+      <a:camera prst="orthographicFront"/>
+      <a:lightRig rig="threePt" dir="t"/>
+    </dgm:scene3d>
+    <dgm:sp3d/>
+    <dgm:txPr/>
+    <dgm:style>
+      <a:lnRef idx="2">
+        <a:scrgbClr r="0" g="0" b="0"/>
+      </a:lnRef>
+      <a:fillRef idx="1">
+        <a:scrgbClr r="0" g="0" b="0"/>
+      </a:fillRef>
+      <a:effectRef idx="0">
+        <a:scrgbClr r="0" g="0" b="0"/>
+      </a:effectRef>
+      <a:fontRef idx="minor">
+        <a:schemeClr val="lt1"/>
+      </a:fontRef>
+    </dgm:style>
+  </dgm:styleLbl>
+  <dgm:styleLbl name="asst4">
+    <dgm:scene3d>
+      <a:camera prst="orthographicFront"/>
+      <a:lightRig rig="threePt" dir="t"/>
+    </dgm:scene3d>
+    <dgm:sp3d/>
+    <dgm:txPr/>
+    <dgm:style>
+      <a:lnRef idx="2">
+        <a:scrgbClr r="0" g="0" b="0"/>
+      </a:lnRef>
+      <a:fillRef idx="1">
+        <a:scrgbClr r="0" g="0" b="0"/>
+      </a:fillRef>
+      <a:effectRef idx="0">
+        <a:scrgbClr r="0" g="0" b="0"/>
+      </a:effectRef>
+      <a:fontRef idx="minor">
+        <a:schemeClr val="lt1"/>
+      </a:fontRef>
+    </dgm:style>
+  </dgm:styleLbl>
+  <dgm:styleLbl name="parChTrans2D1">
+    <dgm:scene3d>
+      <a:camera prst="orthographicFront"/>
+      <a:lightRig rig="threePt" dir="t"/>
+    </dgm:scene3d>
+    <dgm:sp3d/>
+    <dgm:txPr/>
+    <dgm:style>
+      <a:lnRef idx="2">
+        <a:scrgbClr r="0" g="0" b="0"/>
+      </a:lnRef>
+      <a:fillRef idx="1">
+        <a:scrgbClr r="0" g="0" b="0"/>
+      </a:fillRef>
+      <a:effectRef idx="0">
+        <a:scrgbClr r="0" g="0" b="0"/>
+      </a:effectRef>
+      <a:fontRef idx="minor">
+        <a:schemeClr val="lt1"/>
+      </a:fontRef>
+    </dgm:style>
+  </dgm:styleLbl>
+  <dgm:styleLbl name="parChTrans2D2">
+    <dgm:scene3d>
+      <a:camera prst="orthographicFront"/>
+      <a:lightRig rig="threePt" dir="t"/>
+    </dgm:scene3d>
+    <dgm:sp3d/>
+    <dgm:txPr/>
+    <dgm:style>
+      <a:lnRef idx="2">
+        <a:scrgbClr r="0" g="0" b="0"/>
+      </a:lnRef>
+      <a:fillRef idx="1">
+        <a:scrgbClr r="0" g="0" b="0"/>
+      </a:fillRef>
+      <a:effectRef idx="0">
+        <a:scrgbClr r="0" g="0" b="0"/>
+      </a:effectRef>
+      <a:fontRef idx="minor">
+        <a:schemeClr val="lt1"/>
+      </a:fontRef>
+    </dgm:style>
+  </dgm:styleLbl>
+  <dgm:styleLbl name="parChTrans2D3">
+    <dgm:scene3d>
+      <a:camera prst="orthographicFront"/>
+      <a:lightRig rig="threePt" dir="t"/>
+    </dgm:scene3d>
+    <dgm:sp3d/>
+    <dgm:txPr/>
+    <dgm:style>
+      <a:lnRef idx="2">
+        <a:scrgbClr r="0" g="0" b="0"/>
+      </a:lnRef>
+      <a:fillRef idx="1">
+        <a:scrgbClr r="0" g="0" b="0"/>
+      </a:fillRef>
+      <a:effectRef idx="0">
+        <a:scrgbClr r="0" g="0" b="0"/>
+      </a:effectRef>
+      <a:fontRef idx="minor">
+        <a:schemeClr val="lt1"/>
+      </a:fontRef>
+    </dgm:style>
+  </dgm:styleLbl>
+  <dgm:styleLbl name="parChTrans2D4">
+    <dgm:scene3d>
+      <a:camera prst="orthographicFront"/>
+      <a:lightRig rig="threePt" dir="t"/>
+    </dgm:scene3d>
+    <dgm:sp3d/>
+    <dgm:txPr/>
+    <dgm:style>
+      <a:lnRef idx="2">
+        <a:scrgbClr r="0" g="0" b="0"/>
+      </a:lnRef>
+      <a:fillRef idx="1">
+        <a:scrgbClr r="0" g="0" b="0"/>
+      </a:fillRef>
+      <a:effectRef idx="0">
+        <a:scrgbClr r="0" g="0" b="0"/>
+      </a:effectRef>
+      <a:fontRef idx="minor">
+        <a:schemeClr val="lt1"/>
+      </a:fontRef>
+    </dgm:style>
+  </dgm:styleLbl>
+  <dgm:styleLbl name="parChTrans1D1">
+    <dgm:scene3d>
+      <a:camera prst="orthographicFront"/>
+      <a:lightRig rig="threePt" dir="t"/>
+    </dgm:scene3d>
+    <dgm:sp3d/>
+    <dgm:txPr/>
+    <dgm:style>
+      <a:lnRef idx="2">
+        <a:scrgbClr r="0" g="0" b="0"/>
+      </a:lnRef>
+      <a:fillRef idx="0">
+        <a:scrgbClr r="0" g="0" b="0"/>
+      </a:fillRef>
+      <a:effectRef idx="0">
+        <a:scrgbClr r="0" g="0" b="0"/>
+      </a:effectRef>
+      <a:fontRef idx="minor"/>
+    </dgm:style>
+  </dgm:styleLbl>
+  <dgm:styleLbl name="parChTrans1D2">
+    <dgm:scene3d>
+      <a:camera prst="orthographicFront"/>
+      <a:lightRig rig="threePt" dir="t"/>
+    </dgm:scene3d>
+    <dgm:sp3d/>
+    <dgm:txPr/>
+    <dgm:style>
+      <a:lnRef idx="2">
+        <a:scrgbClr r="0" g="0" b="0"/>
+      </a:lnRef>
+      <a:fillRef idx="0">
+        <a:scrgbClr r="0" g="0" b="0"/>
+      </a:fillRef>
+      <a:effectRef idx="0">
+        <a:scrgbClr r="0" g="0" b="0"/>
+      </a:effectRef>
+      <a:fontRef idx="minor"/>
+    </dgm:style>
+  </dgm:styleLbl>
+  <dgm:styleLbl name="parChTrans1D3">
+    <dgm:scene3d>
+      <a:camera prst="orthographicFront"/>
+      <a:lightRig rig="threePt" dir="t"/>
+    </dgm:scene3d>
+    <dgm:sp3d/>
+    <dgm:txPr/>
+    <dgm:style>
+      <a:lnRef idx="2">
+        <a:scrgbClr r="0" g="0" b="0"/>
+      </a:lnRef>
+      <a:fillRef idx="0">
+        <a:scrgbClr r="0" g="0" b="0"/>
+      </a:fillRef>
+      <a:effectRef idx="0">
+        <a:scrgbClr r="0" g="0" b="0"/>
+      </a:effectRef>
+      <a:fontRef idx="minor"/>
+    </dgm:style>
+  </dgm:styleLbl>
+  <dgm:styleLbl name="parChTrans1D4">
+    <dgm:scene3d>
+      <a:camera prst="orthographicFront"/>
+      <a:lightRig rig="threePt" dir="t"/>
+    </dgm:scene3d>
+    <dgm:sp3d/>
+    <dgm:txPr/>
+    <dgm:style>
+      <a:lnRef idx="2">
+        <a:scrgbClr r="0" g="0" b="0"/>
+      </a:lnRef>
+      <a:fillRef idx="0">
+        <a:scrgbClr r="0" g="0" b="0"/>
+      </a:fillRef>
+      <a:effectRef idx="0">
+        <a:scrgbClr r="0" g="0" b="0"/>
+      </a:effectRef>
+      <a:fontRef idx="minor"/>
+    </dgm:style>
+  </dgm:styleLbl>
+  <dgm:styleLbl name="fgAcc1">
+    <dgm:scene3d>
+      <a:camera prst="orthographicFront"/>
+      <a:lightRig rig="threePt" dir="t"/>
+    </dgm:scene3d>
+    <dgm:sp3d/>
+    <dgm:txPr/>
+    <dgm:style>
+      <a:lnRef idx="2">
+        <a:scrgbClr r="0" g="0" b="0"/>
+      </a:lnRef>
+      <a:fillRef idx="1">
+        <a:scrgbClr r="0" g="0" b="0"/>
+      </a:fillRef>
+      <a:effectRef idx="0">
+        <a:scrgbClr r="0" g="0" b="0"/>
+      </a:effectRef>
+      <a:fontRef idx="minor"/>
+    </dgm:style>
+  </dgm:styleLbl>
+  <dgm:styleLbl name="conFgAcc1">
+    <dgm:scene3d>
+      <a:camera prst="orthographicFront"/>
+      <a:lightRig rig="threePt" dir="t"/>
+    </dgm:scene3d>
+    <dgm:sp3d/>
+    <dgm:txPr/>
+    <dgm:style>
+      <a:lnRef idx="2">
+        <a:scrgbClr r="0" g="0" b="0"/>
+      </a:lnRef>
+      <a:fillRef idx="1">
+        <a:scrgbClr r="0" g="0" b="0"/>
+      </a:fillRef>
+      <a:effectRef idx="0">
+        <a:scrgbClr r="0" g="0" b="0"/>
+      </a:effectRef>
+      <a:fontRef idx="minor"/>
+    </dgm:style>
+  </dgm:styleLbl>
+  <dgm:styleLbl name="alignAcc1">
+    <dgm:scene3d>
+      <a:camera prst="orthographicFront"/>
+      <a:lightRig rig="threePt" dir="t"/>
+    </dgm:scene3d>
+    <dgm:sp3d/>
+    <dgm:txPr/>
+    <dgm:style>
+      <a:lnRef idx="2">
+        <a:scrgbClr r="0" g="0" b="0"/>
+      </a:lnRef>
+      <a:fillRef idx="1">
+        <a:scrgbClr r="0" g="0" b="0"/>
+      </a:fillRef>
+      <a:effectRef idx="0">
+        <a:scrgbClr r="0" g="0" b="0"/>
+      </a:effectRef>
+      <a:fontRef idx="minor"/>
+    </dgm:style>
+  </dgm:styleLbl>
+  <dgm:styleLbl name="trAlignAcc1">
+    <dgm:scene3d>
+      <a:camera prst="orthographicFront"/>
+      <a:lightRig rig="threePt" dir="t"/>
+    </dgm:scene3d>
+    <dgm:sp3d/>
+    <dgm:txPr/>
+    <dgm:style>
+      <a:lnRef idx="1">
+        <a:scrgbClr r="0" g="0" b="0"/>
+      </a:lnRef>
+      <a:fillRef idx="1">
+        <a:scrgbClr r="0" g="0" b="0"/>
+      </a:fillRef>
+      <a:effectRef idx="0">
+        <a:scrgbClr r="0" g="0" b="0"/>
+      </a:effectRef>
+      <a:fontRef idx="minor"/>
+    </dgm:style>
+  </dgm:styleLbl>
+  <dgm:styleLbl name="bgAcc1">
+    <dgm:scene3d>
+      <a:camera prst="orthographicFront"/>
+      <a:lightRig rig="threePt" dir="t"/>
+    </dgm:scene3d>
+    <dgm:sp3d/>
+    <dgm:txPr/>
+    <dgm:style>
+      <a:lnRef idx="2">
+        <a:scrgbClr r="0" g="0" b="0"/>
+      </a:lnRef>
+      <a:fillRef idx="1">
+        <a:scrgbClr r="0" g="0" b="0"/>
+      </a:fillRef>
+      <a:effectRef idx="0">
+        <a:scrgbClr r="0" g="0" b="0"/>
+      </a:effectRef>
+      <a:fontRef idx="minor"/>
+    </dgm:style>
+  </dgm:styleLbl>
+  <dgm:styleLbl name="solidFgAcc1">
+    <dgm:scene3d>
+      <a:camera prst="orthographicFront"/>
+      <a:lightRig rig="threePt" dir="t"/>
+    </dgm:scene3d>
+    <dgm:sp3d/>
+    <dgm:txPr/>
+    <dgm:style>
+      <a:lnRef idx="2">
+        <a:scrgbClr r="0" g="0" b="0"/>
+      </a:lnRef>
+      <a:fillRef idx="1">
+        <a:scrgbClr r="0" g="0" b="0"/>
+      </a:fillRef>
+      <a:effectRef idx="0">
+        <a:scrgbClr r="0" g="0" b="0"/>
+      </a:effectRef>
+      <a:fontRef idx="minor"/>
+    </dgm:style>
+  </dgm:styleLbl>
+  <dgm:styleLbl name="solidAlignAcc1">
+    <dgm:scene3d>
+      <a:camera prst="orthographicFront"/>
+      <a:lightRig rig="threePt" dir="t"/>
+    </dgm:scene3d>
+    <dgm:sp3d/>
+    <dgm:txPr/>
+    <dgm:style>
+      <a:lnRef idx="2">
+        <a:scrgbClr r="0" g="0" b="0"/>
+      </a:lnRef>
+      <a:fillRef idx="1">
+        <a:scrgbClr r="0" g="0" b="0"/>
+      </a:fillRef>
+      <a:effectRef idx="0">
+        <a:scrgbClr r="0" g="0" b="0"/>
+      </a:effectRef>
+      <a:fontRef idx="minor"/>
+    </dgm:style>
+  </dgm:styleLbl>
+  <dgm:styleLbl name="solidBgAcc1">
+    <dgm:scene3d>
+      <a:camera prst="orthographicFront"/>
+      <a:lightRig rig="threePt" dir="t"/>
+    </dgm:scene3d>
+    <dgm:sp3d/>
+    <dgm:txPr/>
+    <dgm:style>
+      <a:lnRef idx="2">
+        <a:scrgbClr r="0" g="0" b="0"/>
+      </a:lnRef>
+      <a:fillRef idx="1">
+        <a:scrgbClr r="0" g="0" b="0"/>
+      </a:fillRef>
+      <a:effectRef idx="0">
+        <a:scrgbClr r="0" g="0" b="0"/>
+      </a:effectRef>
+      <a:fontRef idx="minor"/>
+    </dgm:style>
+  </dgm:styleLbl>
+  <dgm:styleLbl name="fgAccFollowNode1">
+    <dgm:scene3d>
+      <a:camera prst="orthographicFront"/>
+      <a:lightRig rig="threePt" dir="t"/>
+    </dgm:scene3d>
+    <dgm:sp3d/>
+    <dgm:txPr/>
+    <dgm:style>
+      <a:lnRef idx="2">
+        <a:scrgbClr r="0" g="0" b="0"/>
+      </a:lnRef>
+      <a:fillRef idx="1">
+        <a:scrgbClr r="0" g="0" b="0"/>
+      </a:fillRef>
+      <a:effectRef idx="0">
+        <a:scrgbClr r="0" g="0" b="0"/>
+      </a:effectRef>
+      <a:fontRef idx="minor"/>
+    </dgm:style>
+  </dgm:styleLbl>
+  <dgm:styleLbl name="alignAccFollowNode1">
+    <dgm:scene3d>
+      <a:camera prst="orthographicFront"/>
+      <a:lightRig rig="threePt" dir="t"/>
+    </dgm:scene3d>
+    <dgm:sp3d/>
+    <dgm:txPr/>
+    <dgm:style>
+      <a:lnRef idx="2">
+        <a:scrgbClr r="0" g="0" b="0"/>
+      </a:lnRef>
+      <a:fillRef idx="1">
+        <a:scrgbClr r="0" g="0" b="0"/>
+      </a:fillRef>
+      <a:effectRef idx="0">
+        <a:scrgbClr r="0" g="0" b="0"/>
+      </a:effectRef>
+      <a:fontRef idx="minor"/>
+    </dgm:style>
+  </dgm:styleLbl>
+  <dgm:styleLbl name="bgAccFollowNode1">
+    <dgm:scene3d>
+      <a:camera prst="orthographicFront"/>
+      <a:lightRig rig="threePt" dir="t"/>
+    </dgm:scene3d>
+    <dgm:sp3d/>
+    <dgm:txPr/>
+    <dgm:style>
+      <a:lnRef idx="2">
+        <a:scrgbClr r="0" g="0" b="0"/>
+      </a:lnRef>
+      <a:fillRef idx="1">
+        <a:scrgbClr r="0" g="0" b="0"/>
+      </a:fillRef>
+      <a:effectRef idx="0">
+        <a:scrgbClr r="0" g="0" b="0"/>
+      </a:effectRef>
+      <a:fontRef idx="minor"/>
+    </dgm:style>
+  </dgm:styleLbl>
+  <dgm:styleLbl name="fgAcc0">
+    <dgm:scene3d>
+      <a:camera prst="orthographicFront"/>
+      <a:lightRig rig="threePt" dir="t"/>
+    </dgm:scene3d>
+    <dgm:sp3d/>
+    <dgm:txPr/>
+    <dgm:style>
+      <a:lnRef idx="2">
+        <a:scrgbClr r="0" g="0" b="0"/>
+      </a:lnRef>
+      <a:fillRef idx="1">
+        <a:scrgbClr r="0" g="0" b="0"/>
+      </a:fillRef>
+      <a:effectRef idx="0">
+        <a:scrgbClr r="0" g="0" b="0"/>
+      </a:effectRef>
+      <a:fontRef idx="minor"/>
+    </dgm:style>
+  </dgm:styleLbl>
+  <dgm:styleLbl name="fgAcc2">
+    <dgm:scene3d>
+      <a:camera prst="orthographicFront"/>
+      <a:lightRig rig="threePt" dir="t"/>
+    </dgm:scene3d>
+    <dgm:sp3d/>
+    <dgm:txPr/>
+    <dgm:style>
+      <a:lnRef idx="2">
+        <a:scrgbClr r="0" g="0" b="0"/>
+      </a:lnRef>
+      <a:fillRef idx="1">
+        <a:scrgbClr r="0" g="0" b="0"/>
+      </a:fillRef>
+      <a:effectRef idx="0">
+        <a:scrgbClr r="0" g="0" b="0"/>
+      </a:effectRef>
+      <a:fontRef idx="minor"/>
+    </dgm:style>
+  </dgm:styleLbl>
+  <dgm:styleLbl name="fgAcc3">
+    <dgm:scene3d>
+      <a:camera prst="orthographicFront"/>
+      <a:lightRig rig="threePt" dir="t"/>
+    </dgm:scene3d>
+    <dgm:sp3d/>
+    <dgm:txPr/>
+    <dgm:style>
+      <a:lnRef idx="2">
+        <a:scrgbClr r="0" g="0" b="0"/>
+      </a:lnRef>
+      <a:fillRef idx="1">
+        <a:scrgbClr r="0" g="0" b="0"/>
+      </a:fillRef>
+      <a:effectRef idx="0">
+        <a:scrgbClr r="0" g="0" b="0"/>
+      </a:effectRef>
+      <a:fontRef idx="minor"/>
+    </dgm:style>
+  </dgm:styleLbl>
+  <dgm:styleLbl name="fgAcc4">
+    <dgm:scene3d>
+      <a:camera prst="orthographicFront"/>
+      <a:lightRig rig="threePt" dir="t"/>
+    </dgm:scene3d>
+    <dgm:sp3d/>
+    <dgm:txPr/>
+    <dgm:style>
+      <a:lnRef idx="2">
+        <a:scrgbClr r="0" g="0" b="0"/>
+      </a:lnRef>
+      <a:fillRef idx="1">
+        <a:scrgbClr r="0" g="0" b="0"/>
+      </a:fillRef>
+      <a:effectRef idx="0">
+        <a:scrgbClr r="0" g="0" b="0"/>
+      </a:effectRef>
+      <a:fontRef idx="minor"/>
+    </dgm:style>
+  </dgm:styleLbl>
+  <dgm:styleLbl name="bgShp">
+    <dgm:scene3d>
+      <a:camera prst="orthographicFront"/>
+      <a:lightRig rig="threePt" dir="t"/>
+    </dgm:scene3d>
+    <dgm:sp3d/>
+    <dgm:txPr/>
+    <dgm:style>
+      <a:lnRef idx="0">
+        <a:scrgbClr r="0" g="0" b="0"/>
+      </a:lnRef>
+      <a:fillRef idx="1">
+        <a:scrgbClr r="0" g="0" b="0"/>
+      </a:fillRef>
+      <a:effectRef idx="0">
+        <a:scrgbClr r="0" g="0" b="0"/>
+      </a:effectRef>
+      <a:fontRef idx="minor"/>
+    </dgm:style>
+  </dgm:styleLbl>
+  <dgm:styleLbl name="dkBgShp">
+    <dgm:scene3d>
+      <a:camera prst="orthographicFront"/>
+      <a:lightRig rig="threePt" dir="t"/>
+    </dgm:scene3d>
+    <dgm:sp3d/>
+    <dgm:txPr/>
+    <dgm:style>
+      <a:lnRef idx="0">
+        <a:scrgbClr r="0" g="0" b="0"/>
+      </a:lnRef>
+      <a:fillRef idx="1">
+        <a:scrgbClr r="0" g="0" b="0"/>
+      </a:fillRef>
+      <a:effectRef idx="0">
+        <a:scrgbClr r="0" g="0" b="0"/>
+      </a:effectRef>
+      <a:fontRef idx="minor"/>
+    </dgm:style>
+  </dgm:styleLbl>
+  <dgm:styleLbl name="trBgShp">
+    <dgm:scene3d>
+      <a:camera prst="orthographicFront"/>
+      <a:lightRig rig="threePt" dir="t"/>
+    </dgm:scene3d>
+    <dgm:sp3d/>
+    <dgm:txPr/>
+    <dgm:style>
+      <a:lnRef idx="0">
+        <a:scrgbClr r="0" g="0" b="0"/>
+      </a:lnRef>
+      <a:fillRef idx="1">
+        <a:scrgbClr r="0" g="0" b="0"/>
+      </a:fillRef>
+      <a:effectRef idx="0">
+        <a:scrgbClr r="0" g="0" b="0"/>
+      </a:effectRef>
+      <a:fontRef idx="minor"/>
+    </dgm:style>
+  </dgm:styleLbl>
+  <dgm:styleLbl name="fgShp">
+    <dgm:scene3d>
+      <a:camera prst="orthographicFront"/>
+      <a:lightRig rig="threePt" dir="t"/>
+    </dgm:scene3d>
+    <dgm:sp3d/>
+    <dgm:txPr/>
+    <dgm:style>
+      <a:lnRef idx="2">
+        <a:scrgbClr r="0" g="0" b="0"/>
+      </a:lnRef>
+      <a:fillRef idx="1">
+        <a:scrgbClr r="0" g="0" b="0"/>
+      </a:fillRef>
+      <a:effectRef idx="0">
+        <a:scrgbClr r="0" g="0" b="0"/>
+      </a:effectRef>
+      <a:fontRef idx="minor"/>
+    </dgm:style>
+  </dgm:styleLbl>
+  <dgm:styleLbl name="revTx">
+    <dgm:scene3d>
+      <a:camera prst="orthographicFront"/>
+      <a:lightRig rig="threePt" dir="t"/>
+    </dgm:scene3d>
+    <dgm:sp3d/>
+    <dgm:txPr/>
+    <dgm:style>
+      <a:lnRef idx="0">
+        <a:scrgbClr r="0" g="0" b="0"/>
+      </a:lnRef>
+      <a:fillRef idx="0">
+        <a:scrgbClr r="0" g="0" b="0"/>
+      </a:fillRef>
+      <a:effectRef idx="0">
+        <a:scrgbClr r="0" g="0" b="0"/>
+      </a:effectRef>
+      <a:fontRef idx="minor"/>
+    </dgm:style>
+  </dgm:styleLbl>
+</dgm:styleDef>
 </file>
 
 <file path=ppt/slideLayouts/slideLayout1.xml><?xml version="1.0" encoding="utf-8"?>
@@ -3613,6 +6259,420 @@
 </p:sld>
 </file>
 
+<file path=ppt/slides/slide10.xml><?xml version="1.0" encoding="utf-8"?>
+<p:sld xmlns:a="http://schemas.openxmlformats.org/drawingml/2006/main" xmlns:r="http://schemas.openxmlformats.org/officeDocument/2006/relationships" xmlns:p="http://schemas.openxmlformats.org/presentationml/2006/main">
+  <p:cSld>
+    <p:bg>
+      <p:bgPr>
+        <a:solidFill>
+          <a:schemeClr val="bg1"/>
+        </a:solidFill>
+        <a:effectLst/>
+      </p:bgPr>
+    </p:bg>
+    <p:spTree>
+      <p:nvGrpSpPr>
+        <p:cNvPr id="1" name=""/>
+        <p:cNvGrpSpPr/>
+        <p:nvPr/>
+      </p:nvGrpSpPr>
+      <p:grpSpPr>
+        <a:xfrm>
+          <a:off x="0" y="0"/>
+          <a:ext cx="0" cy="0"/>
+          <a:chOff x="0" y="0"/>
+          <a:chExt cx="0" cy="0"/>
+        </a:xfrm>
+      </p:grpSpPr>
+      <p:sp>
+        <p:nvSpPr>
+          <p:cNvPr id="21" name="Rectangle 20">
+            <a:extLst>
+              <a:ext uri="{FF2B5EF4-FFF2-40B4-BE49-F238E27FC236}">
+                <a16:creationId xmlns:a16="http://schemas.microsoft.com/office/drawing/2014/main" id="{39E3965E-AC41-4711-9D10-E25ABB132D86}"/>
+              </a:ext>
+              <a:ext uri="{C183D7F6-B498-43B3-948B-1728B52AA6E4}">
+                <adec:decorative xmlns:adec="http://schemas.microsoft.com/office/drawing/2017/decorative" val="1"/>
+              </a:ext>
+            </a:extLst>
+          </p:cNvPr>
+          <p:cNvSpPr>
+            <a:spLocks noGrp="1" noRot="1" noChangeAspect="1" noMove="1" noResize="1" noEditPoints="1" noAdjustHandles="1" noChangeArrowheads="1" noChangeShapeType="1" noTextEdit="1"/>
+          </p:cNvSpPr>
+          <p:nvPr>
+            <p:extLst>
+              <p:ext uri="{386F3935-93C4-4BCD-93E2-E3B085C9AB24}">
+                <p16:designElem xmlns:p16="http://schemas.microsoft.com/office/powerpoint/2015/main" val="1"/>
+              </p:ext>
+            </p:extLst>
+          </p:nvPr>
+        </p:nvSpPr>
+        <p:spPr>
+          <a:xfrm>
+            <a:off x="3175" y="6400800"/>
+            <a:ext cx="12188825" cy="457200"/>
+          </a:xfrm>
+          <a:prstGeom prst="rect">
+            <a:avLst/>
+          </a:prstGeom>
+          <a:solidFill>
+            <a:srgbClr val="262626"/>
+          </a:solidFill>
+          <a:ln>
+            <a:noFill/>
+          </a:ln>
+        </p:spPr>
+        <p:style>
+          <a:lnRef idx="2">
+            <a:schemeClr val="accent1">
+              <a:shade val="50000"/>
+            </a:schemeClr>
+          </a:lnRef>
+          <a:fillRef idx="1">
+            <a:schemeClr val="accent1"/>
+          </a:fillRef>
+          <a:effectRef idx="0">
+            <a:schemeClr val="accent1"/>
+          </a:effectRef>
+          <a:fontRef idx="minor">
+            <a:schemeClr val="lt1"/>
+          </a:fontRef>
+        </p:style>
+        <p:txBody>
+          <a:bodyPr/>
+          <a:lstStyle/>
+          <a:p>
+            <a:endParaRPr lang="en-SG"/>
+          </a:p>
+        </p:txBody>
+      </p:sp>
+      <p:cxnSp>
+        <p:nvCxnSpPr>
+          <p:cNvPr id="22" name="Straight Connector 21">
+            <a:extLst>
+              <a:ext uri="{FF2B5EF4-FFF2-40B4-BE49-F238E27FC236}">
+                <a16:creationId xmlns:a16="http://schemas.microsoft.com/office/drawing/2014/main" id="{1F5DC8C3-BA5F-4EED-BB9A-A14272BD82A1}"/>
+              </a:ext>
+              <a:ext uri="{C183D7F6-B498-43B3-948B-1728B52AA6E4}">
+                <adec:decorative xmlns:adec="http://schemas.microsoft.com/office/drawing/2017/decorative" val="1"/>
+              </a:ext>
+            </a:extLst>
+          </p:cNvPr>
+          <p:cNvCxnSpPr>
+            <a:cxnSpLocks noGrp="1" noRot="1" noChangeAspect="1" noMove="1" noResize="1" noEditPoints="1" noAdjustHandles="1" noChangeArrowheads="1" noChangeShapeType="1"/>
+          </p:cNvCxnSpPr>
+          <p:nvPr>
+            <p:extLst>
+              <p:ext uri="{386F3935-93C4-4BCD-93E2-E3B085C9AB24}">
+                <p16:designElem xmlns:p16="http://schemas.microsoft.com/office/powerpoint/2015/main" val="1"/>
+              </p:ext>
+            </p:extLst>
+          </p:nvPr>
+        </p:nvCxnSpPr>
+        <p:spPr>
+          <a:xfrm>
+            <a:off x="1207658" y="4474741"/>
+            <a:ext cx="9875520" cy="0"/>
+          </a:xfrm>
+          <a:prstGeom prst="line">
+            <a:avLst/>
+          </a:prstGeom>
+          <a:ln w="12700">
+            <a:solidFill>
+              <a:schemeClr val="tx1">
+                <a:lumMod val="75000"/>
+                <a:lumOff val="25000"/>
+              </a:schemeClr>
+            </a:solidFill>
+          </a:ln>
+        </p:spPr>
+        <p:style>
+          <a:lnRef idx="1">
+            <a:schemeClr val="accent1"/>
+          </a:lnRef>
+          <a:fillRef idx="0">
+            <a:schemeClr val="accent1"/>
+          </a:fillRef>
+          <a:effectRef idx="0">
+            <a:schemeClr val="accent1"/>
+          </a:effectRef>
+          <a:fontRef idx="minor">
+            <a:schemeClr val="tx1"/>
+          </a:fontRef>
+        </p:style>
+      </p:cxnSp>
+      <p:sp useBgFill="1">
+        <p:nvSpPr>
+          <p:cNvPr id="23" name="Rectangle 22">
+            <a:extLst>
+              <a:ext uri="{FF2B5EF4-FFF2-40B4-BE49-F238E27FC236}">
+                <a16:creationId xmlns:a16="http://schemas.microsoft.com/office/drawing/2014/main" id="{4C869C3B-5565-4AAC-86A8-9EB0AB1C653E}"/>
+              </a:ext>
+              <a:ext uri="{C183D7F6-B498-43B3-948B-1728B52AA6E4}">
+                <adec:decorative xmlns:adec="http://schemas.microsoft.com/office/drawing/2017/decorative" val="1"/>
+              </a:ext>
+            </a:extLst>
+          </p:cNvPr>
+          <p:cNvSpPr>
+            <a:spLocks noGrp="1" noRot="1" noChangeAspect="1" noMove="1" noResize="1" noEditPoints="1" noAdjustHandles="1" noChangeArrowheads="1" noChangeShapeType="1" noTextEdit="1"/>
+          </p:cNvSpPr>
+          <p:nvPr>
+            <p:extLst>
+              <p:ext uri="{386F3935-93C4-4BCD-93E2-E3B085C9AB24}">
+                <p16:designElem xmlns:p16="http://schemas.microsoft.com/office/powerpoint/2015/main" val="1"/>
+              </p:ext>
+            </p:extLst>
+          </p:nvPr>
+        </p:nvSpPr>
+        <p:spPr>
+          <a:xfrm>
+            <a:off x="0" y="0"/>
+            <a:ext cx="12192001" cy="6858000"/>
+          </a:xfrm>
+          <a:prstGeom prst="rect">
+            <a:avLst/>
+          </a:prstGeom>
+          <a:ln>
+            <a:noFill/>
+          </a:ln>
+        </p:spPr>
+        <p:style>
+          <a:lnRef idx="2">
+            <a:schemeClr val="accent1">
+              <a:shade val="50000"/>
+            </a:schemeClr>
+          </a:lnRef>
+          <a:fillRef idx="1">
+            <a:schemeClr val="accent1"/>
+          </a:fillRef>
+          <a:effectRef idx="0">
+            <a:schemeClr val="accent1"/>
+          </a:effectRef>
+          <a:fontRef idx="minor">
+            <a:schemeClr val="lt1"/>
+          </a:fontRef>
+        </p:style>
+        <p:txBody>
+          <a:bodyPr rtlCol="0" anchor="ctr"/>
+          <a:lstStyle/>
+          <a:p>
+            <a:pPr algn="ctr"/>
+            <a:endParaRPr lang="en-US"/>
+          </a:p>
+        </p:txBody>
+      </p:sp>
+      <p:sp>
+        <p:nvSpPr>
+          <p:cNvPr id="3" name="Title 2">
+            <a:extLst>
+              <a:ext uri="{FF2B5EF4-FFF2-40B4-BE49-F238E27FC236}">
+                <a16:creationId xmlns:a16="http://schemas.microsoft.com/office/drawing/2014/main" id="{BBFBC4C1-B37F-3489-2EE9-4401FD65AC5C}"/>
+              </a:ext>
+            </a:extLst>
+          </p:cNvPr>
+          <p:cNvSpPr>
+            <a:spLocks noGrp="1"/>
+          </p:cNvSpPr>
+          <p:nvPr>
+            <p:ph type="title"/>
+          </p:nvPr>
+        </p:nvSpPr>
+        <p:spPr>
+          <a:xfrm>
+            <a:off x="638423" y="3807725"/>
+            <a:ext cx="10909073" cy="1447062"/>
+          </a:xfrm>
+        </p:spPr>
+        <p:txBody>
+          <a:bodyPr vert="horz" lIns="91440" tIns="45720" rIns="91440" bIns="45720" rtlCol="0" anchor="b">
+            <a:normAutofit/>
+          </a:bodyPr>
+          <a:lstStyle/>
+          <a:p>
+            <a:pPr algn="ctr"/>
+            <a:r>
+              <a:rPr lang="en-US" sz="6000" dirty="0">
+                <a:solidFill>
+                  <a:schemeClr val="tx1">
+                    <a:lumMod val="85000"/>
+                    <a:lumOff val="15000"/>
+                  </a:schemeClr>
+                </a:solidFill>
+              </a:rPr>
+              <a:t>Thank you!</a:t>
+            </a:r>
+          </a:p>
+        </p:txBody>
+      </p:sp>
+      <p:pic>
+        <p:nvPicPr>
+          <p:cNvPr id="24" name="Graphic 23" descr="Handshake">
+            <a:extLst>
+              <a:ext uri="{FF2B5EF4-FFF2-40B4-BE49-F238E27FC236}">
+                <a16:creationId xmlns:a16="http://schemas.microsoft.com/office/drawing/2014/main" id="{56332E12-F321-0FE7-C683-989934586397}"/>
+              </a:ext>
+            </a:extLst>
+          </p:cNvPr>
+          <p:cNvPicPr>
+            <a:picLocks noChangeAspect="1"/>
+          </p:cNvPicPr>
+          <p:nvPr/>
+        </p:nvPicPr>
+        <p:blipFill>
+          <a:blip r:embed="rId2">
+            <a:extLst>
+              <a:ext uri="{28A0092B-C50C-407E-A947-70E740481C1C}">
+                <a14:useLocalDpi xmlns:a14="http://schemas.microsoft.com/office/drawing/2010/main" val="0"/>
+              </a:ext>
+              <a:ext uri="{96DAC541-7B7A-43D3-8B79-37D633B846F1}">
+                <asvg:svgBlip xmlns:asvg="http://schemas.microsoft.com/office/drawing/2016/SVG/main" r:embed="rId3"/>
+              </a:ext>
+            </a:extLst>
+          </a:blip>
+          <a:stretch>
+            <a:fillRect/>
+          </a:stretch>
+        </p:blipFill>
+        <p:spPr>
+          <a:xfrm>
+            <a:off x="4714657" y="771100"/>
+            <a:ext cx="2750022" cy="2750022"/>
+          </a:xfrm>
+          <a:prstGeom prst="rect">
+            <a:avLst/>
+          </a:prstGeom>
+        </p:spPr>
+      </p:pic>
+      <p:cxnSp>
+        <p:nvCxnSpPr>
+          <p:cNvPr id="25" name="Straight Connector 24">
+            <a:extLst>
+              <a:ext uri="{FF2B5EF4-FFF2-40B4-BE49-F238E27FC236}">
+                <a16:creationId xmlns:a16="http://schemas.microsoft.com/office/drawing/2014/main" id="{F41136EC-EC34-4D08-B5AB-8CE5870B1C74}"/>
+              </a:ext>
+              <a:ext uri="{C183D7F6-B498-43B3-948B-1728B52AA6E4}">
+                <adec:decorative xmlns:adec="http://schemas.microsoft.com/office/drawing/2017/decorative" val="1"/>
+              </a:ext>
+            </a:extLst>
+          </p:cNvPr>
+          <p:cNvCxnSpPr>
+            <a:cxnSpLocks noGrp="1" noRot="1" noChangeAspect="1" noMove="1" noResize="1" noEditPoints="1" noAdjustHandles="1" noChangeArrowheads="1" noChangeShapeType="1"/>
+          </p:cNvCxnSpPr>
+          <p:nvPr>
+            <p:extLst>
+              <p:ext uri="{386F3935-93C4-4BCD-93E2-E3B085C9AB24}">
+                <p16:designElem xmlns:p16="http://schemas.microsoft.com/office/powerpoint/2015/main" val="1"/>
+              </p:ext>
+            </p:extLst>
+          </p:nvPr>
+        </p:nvCxnSpPr>
+        <p:spPr>
+          <a:xfrm>
+            <a:off x="1752600" y="5415653"/>
+            <a:ext cx="8686800" cy="0"/>
+          </a:xfrm>
+          <a:prstGeom prst="line">
+            <a:avLst/>
+          </a:prstGeom>
+          <a:ln w="12700">
+            <a:solidFill>
+              <a:schemeClr val="tx1">
+                <a:lumMod val="75000"/>
+                <a:lumOff val="25000"/>
+              </a:schemeClr>
+            </a:solidFill>
+          </a:ln>
+        </p:spPr>
+        <p:style>
+          <a:lnRef idx="1">
+            <a:schemeClr val="accent1"/>
+          </a:lnRef>
+          <a:fillRef idx="0">
+            <a:schemeClr val="accent1"/>
+          </a:fillRef>
+          <a:effectRef idx="0">
+            <a:schemeClr val="accent1"/>
+          </a:effectRef>
+          <a:fontRef idx="minor">
+            <a:schemeClr val="tx1"/>
+          </a:fontRef>
+        </p:style>
+      </p:cxnSp>
+      <p:sp>
+        <p:nvSpPr>
+          <p:cNvPr id="26" name="Rectangle 25">
+            <a:extLst>
+              <a:ext uri="{FF2B5EF4-FFF2-40B4-BE49-F238E27FC236}">
+                <a16:creationId xmlns:a16="http://schemas.microsoft.com/office/drawing/2014/main" id="{9995470A-422C-4D09-B47E-C2E326495B72}"/>
+              </a:ext>
+              <a:ext uri="{C183D7F6-B498-43B3-948B-1728B52AA6E4}">
+                <adec:decorative xmlns:adec="http://schemas.microsoft.com/office/drawing/2017/decorative" val="1"/>
+              </a:ext>
+            </a:extLst>
+          </p:cNvPr>
+          <p:cNvSpPr>
+            <a:spLocks noGrp="1" noRot="1" noChangeAspect="1" noMove="1" noResize="1" noEditPoints="1" noAdjustHandles="1" noChangeArrowheads="1" noChangeShapeType="1" noTextEdit="1"/>
+          </p:cNvSpPr>
+          <p:nvPr>
+            <p:extLst>
+              <p:ext uri="{386F3935-93C4-4BCD-93E2-E3B085C9AB24}">
+                <p16:designElem xmlns:p16="http://schemas.microsoft.com/office/powerpoint/2015/main" val="1"/>
+              </p:ext>
+            </p:extLst>
+          </p:nvPr>
+        </p:nvSpPr>
+        <p:spPr>
+          <a:xfrm>
+            <a:off x="0" y="6400800"/>
+            <a:ext cx="12192000" cy="457200"/>
+          </a:xfrm>
+          <a:prstGeom prst="rect">
+            <a:avLst/>
+          </a:prstGeom>
+          <a:solidFill>
+            <a:srgbClr val="262626"/>
+          </a:solidFill>
+          <a:ln>
+            <a:noFill/>
+          </a:ln>
+        </p:spPr>
+        <p:style>
+          <a:lnRef idx="2">
+            <a:schemeClr val="accent1">
+              <a:shade val="50000"/>
+            </a:schemeClr>
+          </a:lnRef>
+          <a:fillRef idx="1">
+            <a:schemeClr val="accent1"/>
+          </a:fillRef>
+          <a:effectRef idx="0">
+            <a:schemeClr val="accent1"/>
+          </a:effectRef>
+          <a:fontRef idx="minor">
+            <a:schemeClr val="lt1"/>
+          </a:fontRef>
+        </p:style>
+        <p:txBody>
+          <a:bodyPr/>
+          <a:lstStyle/>
+          <a:p>
+            <a:endParaRPr lang="en-SG"/>
+          </a:p>
+        </p:txBody>
+      </p:sp>
+    </p:spTree>
+    <p:extLst>
+      <p:ext uri="{BB962C8B-B14F-4D97-AF65-F5344CB8AC3E}">
+        <p14:creationId xmlns:p14="http://schemas.microsoft.com/office/powerpoint/2010/main" val="1534050449"/>
+      </p:ext>
+    </p:extLst>
+  </p:cSld>
+  <p:clrMapOvr>
+    <a:masterClrMapping/>
+  </p:clrMapOvr>
+</p:sld>
+</file>
+
 <file path=ppt/slides/slide2.xml><?xml version="1.0" encoding="utf-8"?>
 <p:sld xmlns:a="http://schemas.openxmlformats.org/drawingml/2006/main" xmlns:r="http://schemas.openxmlformats.org/officeDocument/2006/relationships" xmlns:p="http://schemas.openxmlformats.org/presentationml/2006/main">
   <p:cSld>
@@ -6284,10 +9344,10 @@
       </p:sp>
       <p:pic>
         <p:nvPicPr>
-          <p:cNvPr id="5" name="Picture 4">
+          <p:cNvPr id="4" name="Picture 3">
             <a:extLst>
               <a:ext uri="{FF2B5EF4-FFF2-40B4-BE49-F238E27FC236}">
-                <a16:creationId xmlns:a16="http://schemas.microsoft.com/office/drawing/2014/main" id="{0DE99332-8187-7FF5-5022-519952CFBDE5}"/>
+                <a16:creationId xmlns:a16="http://schemas.microsoft.com/office/drawing/2014/main" id="{4FD1B2A8-657C-083F-B4CB-5FBF6DEF9A57}"/>
               </a:ext>
             </a:extLst>
           </p:cNvPr>
@@ -6298,13 +9358,13 @@
         </p:nvPicPr>
         <p:blipFill>
           <a:blip r:embed="rId2"/>
-          <a:srcRect t="18669" r="-3" b="5482"/>
+          <a:srcRect t="9388" b="8576"/>
           <a:stretch/>
         </p:blipFill>
         <p:spPr>
           <a:xfrm>
-            <a:off x="4059920" y="1"/>
-            <a:ext cx="4035714" cy="3401058"/>
+            <a:off x="4119949" y="0"/>
+            <a:ext cx="4016407" cy="3429000"/>
           </a:xfrm>
           <a:prstGeom prst="rect">
             <a:avLst/>
@@ -6313,10 +9373,10 @@
       </p:pic>
       <p:pic>
         <p:nvPicPr>
-          <p:cNvPr id="7" name="Picture 6">
+          <p:cNvPr id="9" name="Picture 8">
             <a:extLst>
               <a:ext uri="{FF2B5EF4-FFF2-40B4-BE49-F238E27FC236}">
-                <a16:creationId xmlns:a16="http://schemas.microsoft.com/office/drawing/2014/main" id="{17CD87BB-8ADB-6DF0-0C22-7624D85F3FA8}"/>
+                <a16:creationId xmlns:a16="http://schemas.microsoft.com/office/drawing/2014/main" id="{A3CC5E67-0EA0-59D6-7168-52CB3F77A861}"/>
               </a:ext>
             </a:extLst>
           </p:cNvPr>
@@ -6327,13 +9387,13 @@
         </p:nvPicPr>
         <p:blipFill>
           <a:blip r:embed="rId3"/>
-          <a:srcRect t="17865" r="-1" b="6629"/>
+          <a:srcRect r="44379" b="13148"/>
           <a:stretch/>
         </p:blipFill>
         <p:spPr>
           <a:xfrm>
-            <a:off x="4059924" y="3474720"/>
-            <a:ext cx="4021571" cy="3383280"/>
+            <a:off x="4122782" y="3492717"/>
+            <a:ext cx="4010740" cy="3365283"/>
           </a:xfrm>
           <a:prstGeom prst="rect">
             <a:avLst/>
@@ -6342,10 +9402,10 @@
       </p:pic>
       <p:pic>
         <p:nvPicPr>
-          <p:cNvPr id="12" name="Picture 11">
+          <p:cNvPr id="11" name="Picture 10">
             <a:extLst>
               <a:ext uri="{FF2B5EF4-FFF2-40B4-BE49-F238E27FC236}">
-                <a16:creationId xmlns:a16="http://schemas.microsoft.com/office/drawing/2014/main" id="{E756E2F3-796A-3E00-B3FF-911BB560CA02}"/>
+                <a16:creationId xmlns:a16="http://schemas.microsoft.com/office/drawing/2014/main" id="{65E6750F-BA6F-D22F-CF14-DD211D88C04E}"/>
               </a:ext>
             </a:extLst>
           </p:cNvPr>
@@ -6356,13 +9416,13 @@
         </p:nvPicPr>
         <p:blipFill>
           <a:blip r:embed="rId4"/>
-          <a:srcRect l="13172" r="60890" b="-1"/>
+          <a:srcRect r="13923"/>
           <a:stretch/>
         </p:blipFill>
         <p:spPr>
           <a:xfrm>
-            <a:off x="8175592" y="6086"/>
-            <a:ext cx="4016407" cy="6851914"/>
+            <a:off x="8191068" y="0"/>
+            <a:ext cx="3997758" cy="6858000"/>
           </a:xfrm>
           <a:prstGeom prst="rect">
             <a:avLst/>
@@ -6409,10 +9469,10 @@
       </p:grpSpPr>
       <p:sp>
         <p:nvSpPr>
-          <p:cNvPr id="21" name="Rectangle 20">
+          <p:cNvPr id="11" name="Rectangle 10">
             <a:extLst>
               <a:ext uri="{FF2B5EF4-FFF2-40B4-BE49-F238E27FC236}">
-                <a16:creationId xmlns:a16="http://schemas.microsoft.com/office/drawing/2014/main" id="{39E3965E-AC41-4711-9D10-E25ABB132D86}"/>
+                <a16:creationId xmlns:a16="http://schemas.microsoft.com/office/drawing/2014/main" id="{416A0E3C-60E6-4F39-BC55-5F7C224E1F7C}"/>
               </a:ext>
               <a:ext uri="{C183D7F6-B498-43B3-948B-1728B52AA6E4}">
                 <adec:decorative xmlns:adec="http://schemas.microsoft.com/office/drawing/2017/decorative" val="1"/>
@@ -6471,10 +9531,10 @@
       </p:sp>
       <p:cxnSp>
         <p:nvCxnSpPr>
-          <p:cNvPr id="22" name="Straight Connector 21">
+          <p:cNvPr id="13" name="Straight Connector 12">
             <a:extLst>
               <a:ext uri="{FF2B5EF4-FFF2-40B4-BE49-F238E27FC236}">
-                <a16:creationId xmlns:a16="http://schemas.microsoft.com/office/drawing/2014/main" id="{1F5DC8C3-BA5F-4EED-BB9A-A14272BD82A1}"/>
+                <a16:creationId xmlns:a16="http://schemas.microsoft.com/office/drawing/2014/main" id="{C5025DAC-8B93-4160-B017-3A274A5828C0}"/>
               </a:ext>
               <a:ext uri="{C183D7F6-B498-43B3-948B-1728B52AA6E4}">
                 <adec:decorative xmlns:adec="http://schemas.microsoft.com/office/drawing/2017/decorative" val="1"/>
@@ -6494,205 +9554,8 @@
         </p:nvCxnSpPr>
         <p:spPr>
           <a:xfrm>
-            <a:off x="1207658" y="4474741"/>
-            <a:ext cx="9875520" cy="0"/>
-          </a:xfrm>
-          <a:prstGeom prst="line">
-            <a:avLst/>
-          </a:prstGeom>
-          <a:ln w="12700">
-            <a:solidFill>
-              <a:schemeClr val="tx1">
-                <a:lumMod val="75000"/>
-                <a:lumOff val="25000"/>
-              </a:schemeClr>
-            </a:solidFill>
-          </a:ln>
-        </p:spPr>
-        <p:style>
-          <a:lnRef idx="1">
-            <a:schemeClr val="accent1"/>
-          </a:lnRef>
-          <a:fillRef idx="0">
-            <a:schemeClr val="accent1"/>
-          </a:fillRef>
-          <a:effectRef idx="0">
-            <a:schemeClr val="accent1"/>
-          </a:effectRef>
-          <a:fontRef idx="minor">
-            <a:schemeClr val="tx1"/>
-          </a:fontRef>
-        </p:style>
-      </p:cxnSp>
-      <p:sp useBgFill="1">
-        <p:nvSpPr>
-          <p:cNvPr id="23" name="Rectangle 22">
-            <a:extLst>
-              <a:ext uri="{FF2B5EF4-FFF2-40B4-BE49-F238E27FC236}">
-                <a16:creationId xmlns:a16="http://schemas.microsoft.com/office/drawing/2014/main" id="{4C869C3B-5565-4AAC-86A8-9EB0AB1C653E}"/>
-              </a:ext>
-              <a:ext uri="{C183D7F6-B498-43B3-948B-1728B52AA6E4}">
-                <adec:decorative xmlns:adec="http://schemas.microsoft.com/office/drawing/2017/decorative" val="1"/>
-              </a:ext>
-            </a:extLst>
-          </p:cNvPr>
-          <p:cNvSpPr>
-            <a:spLocks noGrp="1" noRot="1" noChangeAspect="1" noMove="1" noResize="1" noEditPoints="1" noAdjustHandles="1" noChangeArrowheads="1" noChangeShapeType="1" noTextEdit="1"/>
-          </p:cNvSpPr>
-          <p:nvPr>
-            <p:extLst>
-              <p:ext uri="{386F3935-93C4-4BCD-93E2-E3B085C9AB24}">
-                <p16:designElem xmlns:p16="http://schemas.microsoft.com/office/powerpoint/2015/main" val="1"/>
-              </p:ext>
-            </p:extLst>
-          </p:nvPr>
-        </p:nvSpPr>
-        <p:spPr>
-          <a:xfrm>
-            <a:off x="0" y="0"/>
-            <a:ext cx="12192001" cy="6858000"/>
-          </a:xfrm>
-          <a:prstGeom prst="rect">
-            <a:avLst/>
-          </a:prstGeom>
-          <a:ln>
-            <a:noFill/>
-          </a:ln>
-        </p:spPr>
-        <p:style>
-          <a:lnRef idx="2">
-            <a:schemeClr val="accent1">
-              <a:shade val="50000"/>
-            </a:schemeClr>
-          </a:lnRef>
-          <a:fillRef idx="1">
-            <a:schemeClr val="accent1"/>
-          </a:fillRef>
-          <a:effectRef idx="0">
-            <a:schemeClr val="accent1"/>
-          </a:effectRef>
-          <a:fontRef idx="minor">
-            <a:schemeClr val="lt1"/>
-          </a:fontRef>
-        </p:style>
-        <p:txBody>
-          <a:bodyPr rtlCol="0" anchor="ctr"/>
-          <a:lstStyle/>
-          <a:p>
-            <a:pPr algn="ctr"/>
-            <a:endParaRPr lang="en-US"/>
-          </a:p>
-        </p:txBody>
-      </p:sp>
-      <p:sp>
-        <p:nvSpPr>
-          <p:cNvPr id="3" name="Title 2">
-            <a:extLst>
-              <a:ext uri="{FF2B5EF4-FFF2-40B4-BE49-F238E27FC236}">
-                <a16:creationId xmlns:a16="http://schemas.microsoft.com/office/drawing/2014/main" id="{BBFBC4C1-B37F-3489-2EE9-4401FD65AC5C}"/>
-              </a:ext>
-            </a:extLst>
-          </p:cNvPr>
-          <p:cNvSpPr>
-            <a:spLocks noGrp="1"/>
-          </p:cNvSpPr>
-          <p:nvPr>
-            <p:ph type="title"/>
-          </p:nvPr>
-        </p:nvSpPr>
-        <p:spPr>
-          <a:xfrm>
-            <a:off x="638423" y="3807725"/>
-            <a:ext cx="10909073" cy="1447062"/>
-          </a:xfrm>
-        </p:spPr>
-        <p:txBody>
-          <a:bodyPr vert="horz" lIns="91440" tIns="45720" rIns="91440" bIns="45720" rtlCol="0" anchor="b">
-            <a:normAutofit/>
-          </a:bodyPr>
-          <a:lstStyle/>
-          <a:p>
-            <a:pPr algn="ctr"/>
-            <a:r>
-              <a:rPr lang="en-US" sz="6000" dirty="0">
-                <a:solidFill>
-                  <a:schemeClr val="tx1">
-                    <a:lumMod val="85000"/>
-                    <a:lumOff val="15000"/>
-                  </a:schemeClr>
-                </a:solidFill>
-              </a:rPr>
-              <a:t>Thank you!</a:t>
-            </a:r>
-          </a:p>
-        </p:txBody>
-      </p:sp>
-      <p:pic>
-        <p:nvPicPr>
-          <p:cNvPr id="24" name="Graphic 23" descr="Handshake">
-            <a:extLst>
-              <a:ext uri="{FF2B5EF4-FFF2-40B4-BE49-F238E27FC236}">
-                <a16:creationId xmlns:a16="http://schemas.microsoft.com/office/drawing/2014/main" id="{56332E12-F321-0FE7-C683-989934586397}"/>
-              </a:ext>
-            </a:extLst>
-          </p:cNvPr>
-          <p:cNvPicPr>
-            <a:picLocks noChangeAspect="1"/>
-          </p:cNvPicPr>
-          <p:nvPr/>
-        </p:nvPicPr>
-        <p:blipFill>
-          <a:blip r:embed="rId2">
-            <a:extLst>
-              <a:ext uri="{28A0092B-C50C-407E-A947-70E740481C1C}">
-                <a14:useLocalDpi xmlns:a14="http://schemas.microsoft.com/office/drawing/2010/main" val="0"/>
-              </a:ext>
-              <a:ext uri="{96DAC541-7B7A-43D3-8B79-37D633B846F1}">
-                <asvg:svgBlip xmlns:asvg="http://schemas.microsoft.com/office/drawing/2016/SVG/main" r:embed="rId3"/>
-              </a:ext>
-            </a:extLst>
-          </a:blip>
-          <a:stretch>
-            <a:fillRect/>
-          </a:stretch>
-        </p:blipFill>
-        <p:spPr>
-          <a:xfrm>
-            <a:off x="4714657" y="771100"/>
-            <a:ext cx="2750022" cy="2750022"/>
-          </a:xfrm>
-          <a:prstGeom prst="rect">
-            <a:avLst/>
-          </a:prstGeom>
-        </p:spPr>
-      </p:pic>
-      <p:cxnSp>
-        <p:nvCxnSpPr>
-          <p:cNvPr id="25" name="Straight Connector 24">
-            <a:extLst>
-              <a:ext uri="{FF2B5EF4-FFF2-40B4-BE49-F238E27FC236}">
-                <a16:creationId xmlns:a16="http://schemas.microsoft.com/office/drawing/2014/main" id="{F41136EC-EC34-4D08-B5AB-8CE5870B1C74}"/>
-              </a:ext>
-              <a:ext uri="{C183D7F6-B498-43B3-948B-1728B52AA6E4}">
-                <adec:decorative xmlns:adec="http://schemas.microsoft.com/office/drawing/2017/decorative" val="1"/>
-              </a:ext>
-            </a:extLst>
-          </p:cNvPr>
-          <p:cNvCxnSpPr>
-            <a:cxnSpLocks noGrp="1" noRot="1" noChangeAspect="1" noMove="1" noResize="1" noEditPoints="1" noAdjustHandles="1" noChangeArrowheads="1" noChangeShapeType="1"/>
-          </p:cNvCxnSpPr>
-          <p:nvPr>
-            <p:extLst>
-              <p:ext uri="{386F3935-93C4-4BCD-93E2-E3B085C9AB24}">
-                <p16:designElem xmlns:p16="http://schemas.microsoft.com/office/powerpoint/2015/main" val="1"/>
-              </p:ext>
-            </p:extLst>
-          </p:nvPr>
-        </p:nvCxnSpPr>
-        <p:spPr>
-          <a:xfrm>
-            <a:off x="1752600" y="5415653"/>
-            <a:ext cx="8686800" cy="0"/>
+            <a:off x="1193532" y="1897380"/>
+            <a:ext cx="9966960" cy="0"/>
           </a:xfrm>
           <a:prstGeom prst="line">
             <a:avLst/>
@@ -6723,10 +9586,10 @@
       </p:cxnSp>
       <p:sp>
         <p:nvSpPr>
-          <p:cNvPr id="26" name="Rectangle 25">
+          <p:cNvPr id="15" name="Rectangle 14">
             <a:extLst>
               <a:ext uri="{FF2B5EF4-FFF2-40B4-BE49-F238E27FC236}">
-                <a16:creationId xmlns:a16="http://schemas.microsoft.com/office/drawing/2014/main" id="{9995470A-422C-4D09-B47E-C2E326495B72}"/>
+                <a16:creationId xmlns:a16="http://schemas.microsoft.com/office/drawing/2014/main" id="{E844E128-FF69-4E9F-8327-6B504B3C5AE1}"/>
               </a:ext>
               <a:ext uri="{C183D7F6-B498-43B3-948B-1728B52AA6E4}">
                 <adec:decorative xmlns:adec="http://schemas.microsoft.com/office/drawing/2017/decorative" val="1"/>
@@ -6744,16 +9607,19 @@
             </p:extLst>
           </p:nvPr>
         </p:nvSpPr>
-        <p:spPr>
+        <p:spPr bwMode="white">
           <a:xfrm>
-            <a:off x="0" y="6400800"/>
-            <a:ext cx="12192000" cy="457200"/>
+            <a:off x="15" y="0"/>
+            <a:ext cx="12191985" cy="6858000"/>
           </a:xfrm>
           <a:prstGeom prst="rect">
             <a:avLst/>
           </a:prstGeom>
           <a:solidFill>
-            <a:srgbClr val="262626"/>
+            <a:schemeClr val="bg1">
+              <a:lumMod val="85000"/>
+              <a:lumOff val="15000"/>
+            </a:schemeClr>
           </a:solidFill>
           <a:ln>
             <a:noFill/>
@@ -6783,15 +9649,274 @@
           </a:p>
         </p:txBody>
       </p:sp>
+      <p:sp>
+        <p:nvSpPr>
+          <p:cNvPr id="3" name="Title 2">
+            <a:extLst>
+              <a:ext uri="{FF2B5EF4-FFF2-40B4-BE49-F238E27FC236}">
+                <a16:creationId xmlns:a16="http://schemas.microsoft.com/office/drawing/2014/main" id="{CD8C1513-6C96-BCC5-2E02-C213F3976493}"/>
+              </a:ext>
+            </a:extLst>
+          </p:cNvPr>
+          <p:cNvSpPr>
+            <a:spLocks noGrp="1"/>
+          </p:cNvSpPr>
+          <p:nvPr>
+            <p:ph type="title"/>
+          </p:nvPr>
+        </p:nvSpPr>
+        <p:spPr>
+          <a:xfrm>
+            <a:off x="1097280" y="516835"/>
+            <a:ext cx="5977937" cy="1666501"/>
+          </a:xfrm>
+        </p:spPr>
+        <p:txBody>
+          <a:bodyPr vert="horz" lIns="91440" tIns="45720" rIns="91440" bIns="45720" rtlCol="0" anchor="b">
+            <a:normAutofit/>
+          </a:bodyPr>
+          <a:lstStyle/>
+          <a:p>
+            <a:r>
+              <a:rPr lang="en-US" sz="4000">
+                <a:solidFill>
+                  <a:schemeClr val="tx1"/>
+                </a:solidFill>
+              </a:rPr>
+              <a:t>Challenges</a:t>
+            </a:r>
+          </a:p>
+        </p:txBody>
+      </p:sp>
+      <p:cxnSp>
+        <p:nvCxnSpPr>
+          <p:cNvPr id="17" name="Straight Connector 16">
+            <a:extLst>
+              <a:ext uri="{FF2B5EF4-FFF2-40B4-BE49-F238E27FC236}">
+                <a16:creationId xmlns:a16="http://schemas.microsoft.com/office/drawing/2014/main" id="{055CEADF-09EA-423C-8C45-F94AF44D5AF0}"/>
+              </a:ext>
+              <a:ext uri="{C183D7F6-B498-43B3-948B-1728B52AA6E4}">
+                <adec:decorative xmlns:adec="http://schemas.microsoft.com/office/drawing/2017/decorative" val="1"/>
+              </a:ext>
+            </a:extLst>
+          </p:cNvPr>
+          <p:cNvCxnSpPr>
+            <a:cxnSpLocks noGrp="1" noRot="1" noChangeAspect="1" noMove="1" noResize="1" noEditPoints="1" noAdjustHandles="1" noChangeArrowheads="1" noChangeShapeType="1"/>
+          </p:cNvCxnSpPr>
+          <p:nvPr>
+            <p:extLst>
+              <p:ext uri="{386F3935-93C4-4BCD-93E2-E3B085C9AB24}">
+                <p16:designElem xmlns:p16="http://schemas.microsoft.com/office/powerpoint/2015/main" val="1"/>
+              </p:ext>
+            </p:extLst>
+          </p:nvPr>
+        </p:nvCxnSpPr>
+        <p:spPr>
+          <a:xfrm>
+            <a:off x="1215896" y="2353592"/>
+            <a:ext cx="5303520" cy="0"/>
+          </a:xfrm>
+          <a:prstGeom prst="line">
+            <a:avLst/>
+          </a:prstGeom>
+          <a:ln w="19050">
+            <a:solidFill>
+              <a:schemeClr val="accent1"/>
+            </a:solidFill>
+          </a:ln>
+        </p:spPr>
+        <p:style>
+          <a:lnRef idx="1">
+            <a:schemeClr val="accent1"/>
+          </a:lnRef>
+          <a:fillRef idx="0">
+            <a:schemeClr val="accent1"/>
+          </a:fillRef>
+          <a:effectRef idx="0">
+            <a:schemeClr val="accent1"/>
+          </a:effectRef>
+          <a:fontRef idx="minor">
+            <a:schemeClr val="tx1"/>
+          </a:fontRef>
+        </p:style>
+      </p:cxnSp>
+      <p:pic>
+        <p:nvPicPr>
+          <p:cNvPr id="6" name="Picture 5">
+            <a:extLst>
+              <a:ext uri="{FF2B5EF4-FFF2-40B4-BE49-F238E27FC236}">
+                <a16:creationId xmlns:a16="http://schemas.microsoft.com/office/drawing/2014/main" id="{D0ABFFB7-4288-EC12-BC18-995044BD06E3}"/>
+              </a:ext>
+            </a:extLst>
+          </p:cNvPr>
+          <p:cNvPicPr>
+            <a:picLocks noChangeAspect="1"/>
+          </p:cNvPicPr>
+          <p:nvPr/>
+        </p:nvPicPr>
+        <p:blipFill>
+          <a:blip r:embed="rId2"/>
+          <a:srcRect r="13923"/>
+          <a:stretch/>
+        </p:blipFill>
+        <p:spPr>
+          <a:xfrm>
+            <a:off x="8811988" y="643467"/>
+            <a:ext cx="1530629" cy="2624666"/>
+          </a:xfrm>
+          <a:prstGeom prst="rect">
+            <a:avLst/>
+          </a:prstGeom>
+        </p:spPr>
+      </p:pic>
+      <p:pic>
+        <p:nvPicPr>
+          <p:cNvPr id="5" name="Picture 4">
+            <a:extLst>
+              <a:ext uri="{FF2B5EF4-FFF2-40B4-BE49-F238E27FC236}">
+                <a16:creationId xmlns:a16="http://schemas.microsoft.com/office/drawing/2014/main" id="{AEA94553-2C5B-0CDE-B08D-A716A8380FFF}"/>
+              </a:ext>
+            </a:extLst>
+          </p:cNvPr>
+          <p:cNvPicPr>
+            <a:picLocks noChangeAspect="1"/>
+          </p:cNvPicPr>
+          <p:nvPr/>
+        </p:nvPicPr>
+        <p:blipFill>
+          <a:blip r:embed="rId3"/>
+          <a:stretch>
+            <a:fillRect/>
+          </a:stretch>
+        </p:blipFill>
+        <p:spPr>
+          <a:xfrm>
+            <a:off x="7611905" y="4346541"/>
+            <a:ext cx="3936614" cy="1131777"/>
+          </a:xfrm>
+          <a:prstGeom prst="rect">
+            <a:avLst/>
+          </a:prstGeom>
+        </p:spPr>
+      </p:pic>
+      <p:sp>
+        <p:nvSpPr>
+          <p:cNvPr id="7" name="TextBox 6">
+            <a:extLst>
+              <a:ext uri="{FF2B5EF4-FFF2-40B4-BE49-F238E27FC236}">
+                <a16:creationId xmlns:a16="http://schemas.microsoft.com/office/drawing/2014/main" id="{F99FC543-CA47-FF45-014D-F59DF825ACD7}"/>
+              </a:ext>
+            </a:extLst>
+          </p:cNvPr>
+          <p:cNvSpPr txBox="1"/>
+          <p:nvPr/>
+        </p:nvSpPr>
+        <p:spPr>
+          <a:xfrm>
+            <a:off x="8018717" y="5620815"/>
+            <a:ext cx="2961085" cy="615553"/>
+          </a:xfrm>
+          <a:prstGeom prst="rect">
+            <a:avLst/>
+          </a:prstGeom>
+          <a:noFill/>
+        </p:spPr>
+        <p:txBody>
+          <a:bodyPr wrap="square" rtlCol="0">
+            <a:spAutoFit/>
+          </a:bodyPr>
+          <a:lstStyle/>
+          <a:p>
+            <a:pPr algn="ctr"/>
+            <a:r>
+              <a:rPr lang="en-SG" sz="1400" b="1" i="1" dirty="0"/>
+              <a:t>Poor cache key design</a:t>
+            </a:r>
+          </a:p>
+          <a:p>
+            <a:pPr algn="ctr"/>
+            <a:r>
+              <a:rPr lang="en-SG" sz="1000" i="1" dirty="0"/>
+              <a:t> 2 different board positions will produce same inaccurate result</a:t>
+            </a:r>
+          </a:p>
+        </p:txBody>
+      </p:sp>
+      <p:sp>
+        <p:nvSpPr>
+          <p:cNvPr id="8" name="TextBox 7">
+            <a:extLst>
+              <a:ext uri="{FF2B5EF4-FFF2-40B4-BE49-F238E27FC236}">
+                <a16:creationId xmlns:a16="http://schemas.microsoft.com/office/drawing/2014/main" id="{2A9CA38F-2DF1-23DB-BD9B-41C7FB7FBCFB}"/>
+              </a:ext>
+            </a:extLst>
+          </p:cNvPr>
+          <p:cNvSpPr txBox="1"/>
+          <p:nvPr/>
+        </p:nvSpPr>
+        <p:spPr>
+          <a:xfrm>
+            <a:off x="8222123" y="3312028"/>
+            <a:ext cx="2961085" cy="615553"/>
+          </a:xfrm>
+          <a:prstGeom prst="rect">
+            <a:avLst/>
+          </a:prstGeom>
+          <a:noFill/>
+        </p:spPr>
+        <p:txBody>
+          <a:bodyPr wrap="square" rtlCol="0">
+            <a:spAutoFit/>
+          </a:bodyPr>
+          <a:lstStyle/>
+          <a:p>
+            <a:pPr algn="ctr"/>
+            <a:r>
+              <a:rPr lang="en-SG" sz="1400" b="1" i="1" dirty="0"/>
+              <a:t>Good cache key design</a:t>
+            </a:r>
+            <a:endParaRPr lang="en-SG" sz="1000" b="1" i="1" dirty="0"/>
+          </a:p>
+          <a:p>
+            <a:pPr algn="ctr"/>
+            <a:r>
+              <a:rPr lang="en-SG" sz="1000" i="1" dirty="0"/>
+              <a:t>2 different board positions will produce different accurate results as empty spaces accounted for</a:t>
+            </a:r>
+          </a:p>
+        </p:txBody>
+      </p:sp>
+      <p:graphicFrame>
+        <p:nvGraphicFramePr>
+          <p:cNvPr id="19" name="Text Placeholder 3">
+            <a:extLst>
+              <a:ext uri="{FF2B5EF4-FFF2-40B4-BE49-F238E27FC236}">
+                <a16:creationId xmlns:a16="http://schemas.microsoft.com/office/drawing/2014/main" id="{4B7C1BD4-9B10-9B42-EA43-858D59BF65A4}"/>
+              </a:ext>
+            </a:extLst>
+          </p:cNvPr>
+          <p:cNvGraphicFramePr/>
+          <p:nvPr/>
+        </p:nvGraphicFramePr>
+        <p:xfrm>
+          <a:off x="1097279" y="2546224"/>
+          <a:ext cx="5977938" cy="3342747"/>
+        </p:xfrm>
+        <a:graphic>
+          <a:graphicData uri="http://schemas.openxmlformats.org/drawingml/2006/diagram">
+            <dgm:relIds xmlns:dgm="http://schemas.openxmlformats.org/drawingml/2006/diagram" xmlns:r="http://schemas.openxmlformats.org/officeDocument/2006/relationships" r:dm="rId4" r:lo="rId5" r:qs="rId6" r:cs="rId7"/>
+          </a:graphicData>
+        </a:graphic>
+      </p:graphicFrame>
     </p:spTree>
     <p:extLst>
       <p:ext uri="{BB962C8B-B14F-4D97-AF65-F5344CB8AC3E}">
-        <p14:creationId xmlns:p14="http://schemas.microsoft.com/office/powerpoint/2010/main" val="1534050449"/>
+        <p14:creationId xmlns:p14="http://schemas.microsoft.com/office/powerpoint/2010/main" val="2179314494"/>
       </p:ext>
     </p:extLst>
   </p:cSld>
   <p:clrMapOvr>
-    <a:masterClrMapping/>
+    <a:overrideClrMapping bg1="dk1" tx1="lt1" bg2="dk2" tx2="lt2" accent1="accent1" accent2="accent2" accent3="accent3" accent4="accent4" accent5="accent5" accent6="accent6" hlink="hlink" folHlink="folHlink"/>
   </p:clrMapOvr>
 </p:sld>
 </file>
@@ -7123,24 +10248,6 @@
 </file>
 
 <file path=customXml/item1.xml><?xml version="1.0" encoding="utf-8"?>
-<p:properties xmlns:p="http://schemas.microsoft.com/office/2006/metadata/properties" xmlns:xsi="http://www.w3.org/2001/XMLSchema-instance" xmlns:pc="http://schemas.microsoft.com/office/infopath/2007/PartnerControls">
-  <documentManagement>
-    <Status xmlns="71af3243-3dd4-4a8d-8c0d-dd76da1f02a5">Not started</Status>
-    <MediaServiceKeyPoints xmlns="71af3243-3dd4-4a8d-8c0d-dd76da1f02a5" xsi:nil="true"/>
-  </documentManagement>
-</p:properties>
-</file>
-
-<file path=customXml/item2.xml><?xml version="1.0" encoding="utf-8"?>
-<?mso-contentType ?>
-<FormTemplates xmlns="http://schemas.microsoft.com/sharepoint/v3/contenttype/forms">
-  <Display>DocumentLibraryForm</Display>
-  <Edit>DocumentLibraryForm</Edit>
-  <New>DocumentLibraryForm</New>
-</FormTemplates>
-</file>
-
-<file path=customXml/item3.xml><?xml version="1.0" encoding="utf-8"?>
 <ct:contentTypeSchema xmlns:ct="http://schemas.microsoft.com/office/2006/metadata/contentType" xmlns:ma="http://schemas.microsoft.com/office/2006/metadata/properties/metaAttributes" ct:_="" ma:_="" ma:contentTypeName="Document" ma:contentTypeID="0x01010079F111ED35F8CC479449609E8A0923A6" ma:contentTypeVersion="12" ma:contentTypeDescription="Create a new document." ma:contentTypeScope="" ma:versionID="a410dd7f93c95333ffa1b60ed6adedd1">
   <xsd:schema xmlns:xsd="http://www.w3.org/2001/XMLSchema" xmlns:xs="http://www.w3.org/2001/XMLSchema" xmlns:p="http://schemas.microsoft.com/office/2006/metadata/properties" xmlns:ns2="71af3243-3dd4-4a8d-8c0d-dd76da1f02a5" xmlns:ns3="16c05727-aa75-4e4a-9b5f-8a80a1165891" targetNamespace="http://schemas.microsoft.com/office/2006/metadata/properties" ma:root="true" ma:fieldsID="a936d9baba76aa3866493feff160faab" ns2:_="" ns3:_="">
     <xsd:import namespace="71af3243-3dd4-4a8d-8c0d-dd76da1f02a5"/>
@@ -7361,25 +10468,25 @@
 </ct:contentTypeSchema>
 </file>
 
-<file path=customXml/itemProps1.xml><?xml version="1.0" encoding="utf-8"?>
-<ds:datastoreItem xmlns:ds="http://schemas.openxmlformats.org/officeDocument/2006/customXml" ds:itemID="{4F5B1FD9-3BB6-4DA9-A089-3B68C2323D4F}">
-  <ds:schemaRefs>
-    <ds:schemaRef ds:uri="http://schemas.microsoft.com/office/2006/metadata/properties"/>
-    <ds:schemaRef ds:uri="http://schemas.microsoft.com/office/infopath/2007/PartnerControls"/>
-    <ds:schemaRef ds:uri="71af3243-3dd4-4a8d-8c0d-dd76da1f02a5"/>
-  </ds:schemaRefs>
-</ds:datastoreItem>
+<file path=customXml/item2.xml><?xml version="1.0" encoding="utf-8"?>
+<?mso-contentType ?>
+<FormTemplates xmlns="http://schemas.microsoft.com/sharepoint/v3/contenttype/forms">
+  <Display>DocumentLibraryForm</Display>
+  <Edit>DocumentLibraryForm</Edit>
+  <New>DocumentLibraryForm</New>
+</FormTemplates>
 </file>
 
-<file path=customXml/itemProps2.xml><?xml version="1.0" encoding="utf-8"?>
-<ds:datastoreItem xmlns:ds="http://schemas.openxmlformats.org/officeDocument/2006/customXml" ds:itemID="{638A3B04-B0F3-4C12-A722-52B5CF6D9723}">
-  <ds:schemaRefs>
-    <ds:schemaRef ds:uri="http://schemas.microsoft.com/sharepoint/v3/contenttype/forms"/>
-  </ds:schemaRefs>
-</ds:datastoreItem>
+<file path=customXml/item3.xml><?xml version="1.0" encoding="utf-8"?>
+<p:properties xmlns:p="http://schemas.microsoft.com/office/2006/metadata/properties" xmlns:xsi="http://www.w3.org/2001/XMLSchema-instance" xmlns:pc="http://schemas.microsoft.com/office/infopath/2007/PartnerControls">
+  <documentManagement>
+    <Status xmlns="71af3243-3dd4-4a8d-8c0d-dd76da1f02a5">Not started</Status>
+    <MediaServiceKeyPoints xmlns="71af3243-3dd4-4a8d-8c0d-dd76da1f02a5" xsi:nil="true"/>
+  </documentManagement>
+</p:properties>
 </file>
 
-<file path=customXml/itemProps3.xml><?xml version="1.0" encoding="utf-8"?>
+<file path=customXml/itemProps1.xml><?xml version="1.0" encoding="utf-8"?>
 <ds:datastoreItem xmlns:ds="http://schemas.openxmlformats.org/officeDocument/2006/customXml" ds:itemID="{1747A963-53E0-44AF-AF13-963FE676C682}">
   <ds:schemaRefs>
     <ds:schemaRef ds:uri="http://schemas.microsoft.com/office/2006/metadata/contentType"/>
@@ -7396,4 +10503,22 @@
     <ds:schemaRef ds:uri="http://schemas.microsoft.com/internal/obd"/>
   </ds:schemaRefs>
 </ds:datastoreItem>
+</file>
+
+<file path=customXml/itemProps2.xml><?xml version="1.0" encoding="utf-8"?>
+<ds:datastoreItem xmlns:ds="http://schemas.openxmlformats.org/officeDocument/2006/customXml" ds:itemID="{638A3B04-B0F3-4C12-A722-52B5CF6D9723}">
+  <ds:schemaRefs>
+    <ds:schemaRef ds:uri="http://schemas.microsoft.com/sharepoint/v3/contenttype/forms"/>
+  </ds:schemaRefs>
+</ds:datastoreItem>
+</file>
+
+<file path=customXml/itemProps3.xml><?xml version="1.0" encoding="utf-8"?>
+<ds:datastoreItem xmlns:ds="http://schemas.openxmlformats.org/officeDocument/2006/customXml" ds:itemID="{4F5B1FD9-3BB6-4DA9-A089-3B68C2323D4F}">
+  <ds:schemaRefs>
+    <ds:schemaRef ds:uri="http://schemas.microsoft.com/office/2006/metadata/properties"/>
+    <ds:schemaRef ds:uri="http://schemas.microsoft.com/office/infopath/2007/PartnerControls"/>
+    <ds:schemaRef ds:uri="71af3243-3dd4-4a8d-8c0d-dd76da1f02a5"/>
+  </ds:schemaRefs>
+</ds:datastoreItem>
 </file>
</xml_diff>